<commit_message>
Melhorias na apresentação e documentação do readme
</commit_message>
<xml_diff>
--- a/deck/VSSUMMIT2018V2.pptx
+++ b/deck/VSSUMMIT2018V2.pptx
@@ -6,18 +6,21 @@
     <p:sldMasterId id="2147483662" r:id="rId2"/>
   </p:sldMasterIdLst>
   <p:notesMasterIdLst>
-    <p:notesMasterId r:id="rId12"/>
+    <p:notesMasterId r:id="rId15"/>
   </p:notesMasterIdLst>
   <p:sldIdLst>
     <p:sldId id="256" r:id="rId3"/>
-    <p:sldId id="267" r:id="rId4"/>
-    <p:sldId id="270" r:id="rId5"/>
-    <p:sldId id="275" r:id="rId6"/>
-    <p:sldId id="274" r:id="rId7"/>
-    <p:sldId id="271" r:id="rId8"/>
-    <p:sldId id="276" r:id="rId9"/>
-    <p:sldId id="262" r:id="rId10"/>
-    <p:sldId id="269" r:id="rId11"/>
+    <p:sldId id="279" r:id="rId4"/>
+    <p:sldId id="267" r:id="rId5"/>
+    <p:sldId id="270" r:id="rId6"/>
+    <p:sldId id="275" r:id="rId7"/>
+    <p:sldId id="278" r:id="rId8"/>
+    <p:sldId id="274" r:id="rId9"/>
+    <p:sldId id="271" r:id="rId10"/>
+    <p:sldId id="277" r:id="rId11"/>
+    <p:sldId id="276" r:id="rId12"/>
+    <p:sldId id="262" r:id="rId13"/>
+    <p:sldId id="269" r:id="rId14"/>
   </p:sldIdLst>
   <p:sldSz cx="12192000" cy="6858000"/>
   <p:notesSz cx="6858000" cy="9144000"/>
@@ -471,6 +474,216 @@
     </a:lvl9pPr>
   </p:notesStyle>
 </p:notesMaster>
+</file>
+
+<file path=ppt/notesSlides/notesSlide1.xml><?xml version="1.0" encoding="utf-8"?>
+<p:notes xmlns:a="http://schemas.openxmlformats.org/drawingml/2006/main" xmlns:r="http://schemas.openxmlformats.org/officeDocument/2006/relationships" xmlns:p="http://schemas.openxmlformats.org/presentationml/2006/main">
+  <p:cSld>
+    <p:spTree>
+      <p:nvGrpSpPr>
+        <p:cNvPr id="1" name=""/>
+        <p:cNvGrpSpPr/>
+        <p:nvPr/>
+      </p:nvGrpSpPr>
+      <p:grpSpPr>
+        <a:xfrm>
+          <a:off x="0" y="0"/>
+          <a:ext cx="0" cy="0"/>
+          <a:chOff x="0" y="0"/>
+          <a:chExt cx="0" cy="0"/>
+        </a:xfrm>
+      </p:grpSpPr>
+      <p:sp>
+        <p:nvSpPr>
+          <p:cNvPr id="2" name="Slide Image Placeholder 1"/>
+          <p:cNvSpPr>
+            <a:spLocks noGrp="1" noRot="1" noChangeAspect="1"/>
+          </p:cNvSpPr>
+          <p:nvPr>
+            <p:ph type="sldImg"/>
+          </p:nvPr>
+        </p:nvSpPr>
+        <p:spPr/>
+      </p:sp>
+      <p:sp>
+        <p:nvSpPr>
+          <p:cNvPr id="3" name="Notes Placeholder 2"/>
+          <p:cNvSpPr>
+            <a:spLocks noGrp="1"/>
+          </p:cNvSpPr>
+          <p:nvPr>
+            <p:ph type="body" idx="1"/>
+          </p:nvPr>
+        </p:nvSpPr>
+        <p:spPr/>
+        <p:txBody>
+          <a:bodyPr/>
+          <a:lstStyle/>
+          <a:p>
+            <a:r>
+              <a:rPr lang="en-US" dirty="0" err="1"/>
+              <a:t>Existem</a:t>
+            </a:r>
+            <a:r>
+              <a:rPr lang="en-US" dirty="0"/>
+              <a:t> </a:t>
+            </a:r>
+            <a:r>
+              <a:rPr lang="en-US" dirty="0" err="1"/>
+              <a:t>vários</a:t>
+            </a:r>
+            <a:r>
+              <a:rPr lang="en-US" dirty="0"/>
+              <a:t> </a:t>
+            </a:r>
+            <a:r>
+              <a:rPr lang="en-US" dirty="0" err="1"/>
+              <a:t>tipos</a:t>
+            </a:r>
+            <a:r>
+              <a:rPr lang="en-US" dirty="0"/>
+              <a:t> </a:t>
+            </a:r>
+            <a:r>
+              <a:rPr lang="en-US"/>
+              <a:t>de toggles</a:t>
+            </a:r>
+          </a:p>
+        </p:txBody>
+      </p:sp>
+      <p:sp>
+        <p:nvSpPr>
+          <p:cNvPr id="4" name="Slide Number Placeholder 3"/>
+          <p:cNvSpPr>
+            <a:spLocks noGrp="1"/>
+          </p:cNvSpPr>
+          <p:nvPr>
+            <p:ph type="sldNum" sz="quarter" idx="5"/>
+          </p:nvPr>
+        </p:nvSpPr>
+        <p:spPr/>
+        <p:txBody>
+          <a:bodyPr/>
+          <a:lstStyle/>
+          <a:p>
+            <a:fld id="{1816EDED-A3D5-4DB0-92D7-4A78EB9C8009}" type="slidenum">
+              <a:rPr lang="pt-BR" smtClean="0"/>
+              <a:t>5</a:t>
+            </a:fld>
+            <a:endParaRPr lang="pt-BR"/>
+          </a:p>
+        </p:txBody>
+      </p:sp>
+    </p:spTree>
+    <p:extLst>
+      <p:ext uri="{BB962C8B-B14F-4D97-AF65-F5344CB8AC3E}">
+        <p14:creationId xmlns:p14="http://schemas.microsoft.com/office/powerpoint/2010/main" val="1769555862"/>
+      </p:ext>
+    </p:extLst>
+  </p:cSld>
+  <p:clrMapOvr>
+    <a:masterClrMapping/>
+  </p:clrMapOvr>
+</p:notes>
+</file>
+
+<file path=ppt/notesSlides/notesSlide2.xml><?xml version="1.0" encoding="utf-8"?>
+<p:notes xmlns:a="http://schemas.openxmlformats.org/drawingml/2006/main" xmlns:r="http://schemas.openxmlformats.org/officeDocument/2006/relationships" xmlns:p="http://schemas.openxmlformats.org/presentationml/2006/main">
+  <p:cSld>
+    <p:spTree>
+      <p:nvGrpSpPr>
+        <p:cNvPr id="1" name=""/>
+        <p:cNvGrpSpPr/>
+        <p:nvPr/>
+      </p:nvGrpSpPr>
+      <p:grpSpPr>
+        <a:xfrm>
+          <a:off x="0" y="0"/>
+          <a:ext cx="0" cy="0"/>
+          <a:chOff x="0" y="0"/>
+          <a:chExt cx="0" cy="0"/>
+        </a:xfrm>
+      </p:grpSpPr>
+      <p:sp>
+        <p:nvSpPr>
+          <p:cNvPr id="2" name="Slide Image Placeholder 1"/>
+          <p:cNvSpPr>
+            <a:spLocks noGrp="1" noRot="1" noChangeAspect="1"/>
+          </p:cNvSpPr>
+          <p:nvPr>
+            <p:ph type="sldImg"/>
+          </p:nvPr>
+        </p:nvSpPr>
+        <p:spPr/>
+      </p:sp>
+      <p:sp>
+        <p:nvSpPr>
+          <p:cNvPr id="3" name="Notes Placeholder 2"/>
+          <p:cNvSpPr>
+            <a:spLocks noGrp="1"/>
+          </p:cNvSpPr>
+          <p:nvPr>
+            <p:ph type="body" idx="1"/>
+          </p:nvPr>
+        </p:nvSpPr>
+        <p:spPr/>
+        <p:txBody>
+          <a:bodyPr/>
+          <a:lstStyle/>
+          <a:p>
+            <a:r>
+              <a:rPr lang="en-US" dirty="0" err="1"/>
+              <a:t>Tem</a:t>
+            </a:r>
+            <a:r>
+              <a:rPr lang="en-US" dirty="0"/>
+              <a:t> que </a:t>
+            </a:r>
+            <a:r>
+              <a:rPr lang="en-US" dirty="0" err="1"/>
+              <a:t>gerenciar</a:t>
+            </a:r>
+            <a:r>
+              <a:rPr lang="en-US" dirty="0"/>
+              <a:t> Toggles tb</a:t>
+            </a:r>
+          </a:p>
+        </p:txBody>
+      </p:sp>
+      <p:sp>
+        <p:nvSpPr>
+          <p:cNvPr id="4" name="Slide Number Placeholder 3"/>
+          <p:cNvSpPr>
+            <a:spLocks noGrp="1"/>
+          </p:cNvSpPr>
+          <p:nvPr>
+            <p:ph type="sldNum" sz="quarter" idx="5"/>
+          </p:nvPr>
+        </p:nvSpPr>
+        <p:spPr/>
+        <p:txBody>
+          <a:bodyPr/>
+          <a:lstStyle/>
+          <a:p>
+            <a:fld id="{1816EDED-A3D5-4DB0-92D7-4A78EB9C8009}" type="slidenum">
+              <a:rPr lang="pt-BR" smtClean="0"/>
+              <a:t>10</a:t>
+            </a:fld>
+            <a:endParaRPr lang="pt-BR"/>
+          </a:p>
+        </p:txBody>
+      </p:sp>
+    </p:spTree>
+    <p:extLst>
+      <p:ext uri="{BB962C8B-B14F-4D97-AF65-F5344CB8AC3E}">
+        <p14:creationId xmlns:p14="http://schemas.microsoft.com/office/powerpoint/2010/main" val="2241353082"/>
+      </p:ext>
+    </p:extLst>
+  </p:cSld>
+  <p:clrMapOvr>
+    <a:masterClrMapping/>
+  </p:clrMapOvr>
+</p:notes>
 </file>
 
 <file path=ppt/slideLayouts/slideLayout1.xml><?xml version="1.0" encoding="utf-8"?>
@@ -5865,7 +6078,1896 @@
 </p:sld>
 </file>
 
+<file path=ppt/slides/slide10.xml><?xml version="1.0" encoding="utf-8"?>
+<p:sld xmlns:a="http://schemas.openxmlformats.org/drawingml/2006/main" xmlns:r="http://schemas.openxmlformats.org/officeDocument/2006/relationships" xmlns:p="http://schemas.openxmlformats.org/presentationml/2006/main">
+  <p:cSld>
+    <p:spTree>
+      <p:nvGrpSpPr>
+        <p:cNvPr id="1" name=""/>
+        <p:cNvGrpSpPr/>
+        <p:nvPr/>
+      </p:nvGrpSpPr>
+      <p:grpSpPr>
+        <a:xfrm>
+          <a:off x="0" y="0"/>
+          <a:ext cx="0" cy="0"/>
+          <a:chOff x="0" y="0"/>
+          <a:chExt cx="0" cy="0"/>
+        </a:xfrm>
+      </p:grpSpPr>
+      <p:sp>
+        <p:nvSpPr>
+          <p:cNvPr id="3" name="Título 2"/>
+          <p:cNvSpPr>
+            <a:spLocks noGrp="1"/>
+          </p:cNvSpPr>
+          <p:nvPr>
+            <p:ph type="title"/>
+          </p:nvPr>
+        </p:nvSpPr>
+        <p:spPr/>
+        <p:txBody>
+          <a:bodyPr>
+            <a:normAutofit/>
+          </a:bodyPr>
+          <a:lstStyle/>
+          <a:p>
+            <a:r>
+              <a:rPr lang="pt-BR" sz="5400" spc="-300" dirty="0">
+                <a:solidFill>
+                  <a:schemeClr val="tx1"/>
+                </a:solidFill>
+              </a:rPr>
+              <a:t>Vantagens e desvantagens</a:t>
+            </a:r>
+          </a:p>
+        </p:txBody>
+      </p:sp>
+      <p:sp>
+        <p:nvSpPr>
+          <p:cNvPr id="4" name="CaixaDeTexto 3">
+            <a:extLst>
+              <a:ext uri="{FF2B5EF4-FFF2-40B4-BE49-F238E27FC236}">
+                <a16:creationId xmlns:a16="http://schemas.microsoft.com/office/drawing/2014/main" id="{057F1F55-D955-43F8-933C-19B7AF554E3E}"/>
+              </a:ext>
+            </a:extLst>
+          </p:cNvPr>
+          <p:cNvSpPr txBox="1"/>
+          <p:nvPr/>
+        </p:nvSpPr>
+        <p:spPr>
+          <a:xfrm>
+            <a:off x="9596486" y="6380946"/>
+            <a:ext cx="2488676" cy="477054"/>
+          </a:xfrm>
+          <a:prstGeom prst="rect">
+            <a:avLst/>
+          </a:prstGeom>
+          <a:noFill/>
+        </p:spPr>
+        <p:txBody>
+          <a:bodyPr wrap="square" rtlCol="0">
+            <a:spAutoFit/>
+          </a:bodyPr>
+          <a:lstStyle/>
+          <a:p>
+            <a:r>
+              <a:rPr lang="pt-BR" sz="2500" b="1" dirty="0">
+                <a:solidFill>
+                  <a:srgbClr val="67217A"/>
+                </a:solidFill>
+                <a:latin typeface="Verdana" panose="020B0604030504040204" pitchFamily="34" charset="0"/>
+                <a:ea typeface="Verdana" panose="020B0604030504040204" pitchFamily="34" charset="0"/>
+                <a:cs typeface="Verdana" panose="020B0604030504040204" pitchFamily="34" charset="0"/>
+              </a:rPr>
+              <a:t>#VSSUMMIT</a:t>
+            </a:r>
+          </a:p>
+        </p:txBody>
+      </p:sp>
+      <p:cxnSp>
+        <p:nvCxnSpPr>
+          <p:cNvPr id="7" name="Straight Connector 6">
+            <a:extLst>
+              <a:ext uri="{FF2B5EF4-FFF2-40B4-BE49-F238E27FC236}">
+                <a16:creationId xmlns:a16="http://schemas.microsoft.com/office/drawing/2014/main" id="{A8E051CC-4DB5-4D2E-8080-CB4300EFCCB1}"/>
+              </a:ext>
+            </a:extLst>
+          </p:cNvPr>
+          <p:cNvCxnSpPr/>
+          <p:nvPr/>
+        </p:nvCxnSpPr>
+        <p:spPr>
+          <a:xfrm>
+            <a:off x="5878286" y="2573383"/>
+            <a:ext cx="0" cy="3971108"/>
+          </a:xfrm>
+          <a:prstGeom prst="line">
+            <a:avLst/>
+          </a:prstGeom>
+          <a:ln w="28575">
+            <a:solidFill>
+              <a:schemeClr val="bg1">
+                <a:lumMod val="50000"/>
+              </a:schemeClr>
+            </a:solidFill>
+          </a:ln>
+        </p:spPr>
+        <p:style>
+          <a:lnRef idx="1">
+            <a:schemeClr val="accent1"/>
+          </a:lnRef>
+          <a:fillRef idx="0">
+            <a:schemeClr val="accent1"/>
+          </a:fillRef>
+          <a:effectRef idx="0">
+            <a:schemeClr val="accent1"/>
+          </a:effectRef>
+          <a:fontRef idx="minor">
+            <a:schemeClr val="tx1"/>
+          </a:fontRef>
+        </p:style>
+      </p:cxnSp>
+      <p:pic>
+        <p:nvPicPr>
+          <p:cNvPr id="9" name="Picture 8" descr="A close up of a logo&#10;&#10;Description automatically generated">
+            <a:extLst>
+              <a:ext uri="{FF2B5EF4-FFF2-40B4-BE49-F238E27FC236}">
+                <a16:creationId xmlns:a16="http://schemas.microsoft.com/office/drawing/2014/main" id="{5E63E8CD-33D8-439B-9ED3-C5906008EA04}"/>
+              </a:ext>
+            </a:extLst>
+          </p:cNvPr>
+          <p:cNvPicPr>
+            <a:picLocks noChangeAspect="1"/>
+          </p:cNvPicPr>
+          <p:nvPr/>
+        </p:nvPicPr>
+        <p:blipFill>
+          <a:blip r:embed="rId3"/>
+          <a:stretch>
+            <a:fillRect/>
+          </a:stretch>
+        </p:blipFill>
+        <p:spPr>
+          <a:xfrm>
+            <a:off x="6875237" y="2573383"/>
+            <a:ext cx="862149" cy="862149"/>
+          </a:xfrm>
+          <a:prstGeom prst="rect">
+            <a:avLst/>
+          </a:prstGeom>
+        </p:spPr>
+      </p:pic>
+      <p:pic>
+        <p:nvPicPr>
+          <p:cNvPr id="11" name="Picture 10" descr="A close up of a sign&#10;&#10;Description automatically generated">
+            <a:extLst>
+              <a:ext uri="{FF2B5EF4-FFF2-40B4-BE49-F238E27FC236}">
+                <a16:creationId xmlns:a16="http://schemas.microsoft.com/office/drawing/2014/main" id="{4C11911E-2200-4FA2-B5F3-C17E972E2188}"/>
+              </a:ext>
+            </a:extLst>
+          </p:cNvPr>
+          <p:cNvPicPr>
+            <a:picLocks noChangeAspect="1"/>
+          </p:cNvPicPr>
+          <p:nvPr/>
+        </p:nvPicPr>
+        <p:blipFill>
+          <a:blip r:embed="rId4"/>
+          <a:stretch>
+            <a:fillRect/>
+          </a:stretch>
+        </p:blipFill>
+        <p:spPr>
+          <a:xfrm>
+            <a:off x="1024128" y="2573383"/>
+            <a:ext cx="862149" cy="862149"/>
+          </a:xfrm>
+          <a:prstGeom prst="rect">
+            <a:avLst/>
+          </a:prstGeom>
+        </p:spPr>
+      </p:pic>
+      <p:pic>
+        <p:nvPicPr>
+          <p:cNvPr id="13" name="Picture 12">
+            <a:extLst>
+              <a:ext uri="{FF2B5EF4-FFF2-40B4-BE49-F238E27FC236}">
+                <a16:creationId xmlns:a16="http://schemas.microsoft.com/office/drawing/2014/main" id="{68ADA295-9C2E-42D2-8B5F-4B9BBEC5EFF0}"/>
+              </a:ext>
+            </a:extLst>
+          </p:cNvPr>
+          <p:cNvPicPr>
+            <a:picLocks noChangeAspect="1"/>
+          </p:cNvPicPr>
+          <p:nvPr/>
+        </p:nvPicPr>
+        <p:blipFill>
+          <a:blip r:embed="rId5"/>
+          <a:stretch>
+            <a:fillRect/>
+          </a:stretch>
+        </p:blipFill>
+        <p:spPr>
+          <a:xfrm>
+            <a:off x="4025719" y="2573383"/>
+            <a:ext cx="855617" cy="855617"/>
+          </a:xfrm>
+          <a:prstGeom prst="rect">
+            <a:avLst/>
+          </a:prstGeom>
+        </p:spPr>
+      </p:pic>
+      <p:pic>
+        <p:nvPicPr>
+          <p:cNvPr id="15" name="Picture 14" descr="A close up of a logo&#10;&#10;Description automatically generated">
+            <a:extLst>
+              <a:ext uri="{FF2B5EF4-FFF2-40B4-BE49-F238E27FC236}">
+                <a16:creationId xmlns:a16="http://schemas.microsoft.com/office/drawing/2014/main" id="{826AF9DF-90A7-421C-9491-DA4A78AC1854}"/>
+              </a:ext>
+            </a:extLst>
+          </p:cNvPr>
+          <p:cNvPicPr>
+            <a:picLocks noChangeAspect="1"/>
+          </p:cNvPicPr>
+          <p:nvPr/>
+        </p:nvPicPr>
+        <p:blipFill>
+          <a:blip r:embed="rId6">
+            <a:duotone>
+              <a:schemeClr val="accent3">
+                <a:shade val="45000"/>
+                <a:satMod val="135000"/>
+              </a:schemeClr>
+              <a:prstClr val="white"/>
+            </a:duotone>
+          </a:blip>
+          <a:stretch>
+            <a:fillRect/>
+          </a:stretch>
+        </p:blipFill>
+        <p:spPr>
+          <a:xfrm>
+            <a:off x="1030660" y="4558937"/>
+            <a:ext cx="855617" cy="855617"/>
+          </a:xfrm>
+          <a:prstGeom prst="rect">
+            <a:avLst/>
+          </a:prstGeom>
+        </p:spPr>
+      </p:pic>
+      <p:pic>
+        <p:nvPicPr>
+          <p:cNvPr id="17" name="Picture 16">
+            <a:extLst>
+              <a:ext uri="{FF2B5EF4-FFF2-40B4-BE49-F238E27FC236}">
+                <a16:creationId xmlns:a16="http://schemas.microsoft.com/office/drawing/2014/main" id="{90023631-50DD-4A6A-87F8-9CB7286F8197}"/>
+              </a:ext>
+            </a:extLst>
+          </p:cNvPr>
+          <p:cNvPicPr>
+            <a:picLocks noChangeAspect="1"/>
+          </p:cNvPicPr>
+          <p:nvPr/>
+        </p:nvPicPr>
+        <p:blipFill>
+          <a:blip r:embed="rId7"/>
+          <a:stretch>
+            <a:fillRect/>
+          </a:stretch>
+        </p:blipFill>
+        <p:spPr>
+          <a:xfrm>
+            <a:off x="4025719" y="4552404"/>
+            <a:ext cx="862150" cy="862150"/>
+          </a:xfrm>
+          <a:prstGeom prst="rect">
+            <a:avLst/>
+          </a:prstGeom>
+        </p:spPr>
+      </p:pic>
+      <p:pic>
+        <p:nvPicPr>
+          <p:cNvPr id="19" name="Picture 18">
+            <a:extLst>
+              <a:ext uri="{FF2B5EF4-FFF2-40B4-BE49-F238E27FC236}">
+                <a16:creationId xmlns:a16="http://schemas.microsoft.com/office/drawing/2014/main" id="{C8C5A583-A2BA-4273-B6EA-A13D39405347}"/>
+              </a:ext>
+            </a:extLst>
+          </p:cNvPr>
+          <p:cNvPicPr>
+            <a:picLocks noChangeAspect="1"/>
+          </p:cNvPicPr>
+          <p:nvPr/>
+        </p:nvPicPr>
+        <p:blipFill>
+          <a:blip r:embed="rId8"/>
+          <a:stretch>
+            <a:fillRect/>
+          </a:stretch>
+        </p:blipFill>
+        <p:spPr>
+          <a:xfrm>
+            <a:off x="9870296" y="2566850"/>
+            <a:ext cx="862150" cy="862150"/>
+          </a:xfrm>
+          <a:prstGeom prst="rect">
+            <a:avLst/>
+          </a:prstGeom>
+        </p:spPr>
+      </p:pic>
+      <p:pic>
+        <p:nvPicPr>
+          <p:cNvPr id="21" name="Picture 20">
+            <a:extLst>
+              <a:ext uri="{FF2B5EF4-FFF2-40B4-BE49-F238E27FC236}">
+                <a16:creationId xmlns:a16="http://schemas.microsoft.com/office/drawing/2014/main" id="{2FC4FECE-0C0C-44B1-A276-C6A58A117C48}"/>
+              </a:ext>
+            </a:extLst>
+          </p:cNvPr>
+          <p:cNvPicPr>
+            <a:picLocks noChangeAspect="1"/>
+          </p:cNvPicPr>
+          <p:nvPr/>
+        </p:nvPicPr>
+        <p:blipFill>
+          <a:blip r:embed="rId9"/>
+          <a:stretch>
+            <a:fillRect/>
+          </a:stretch>
+        </p:blipFill>
+        <p:spPr>
+          <a:xfrm>
+            <a:off x="2589057" y="3581834"/>
+            <a:ext cx="862150" cy="862150"/>
+          </a:xfrm>
+          <a:prstGeom prst="rect">
+            <a:avLst/>
+          </a:prstGeom>
+        </p:spPr>
+      </p:pic>
+      <p:pic>
+        <p:nvPicPr>
+          <p:cNvPr id="23" name="Picture 22" descr="A picture containing vector graphics&#10;&#10;Description automatically generated">
+            <a:extLst>
+              <a:ext uri="{FF2B5EF4-FFF2-40B4-BE49-F238E27FC236}">
+                <a16:creationId xmlns:a16="http://schemas.microsoft.com/office/drawing/2014/main" id="{6E341A6A-14F3-4D76-92B8-FBC487E655EF}"/>
+              </a:ext>
+            </a:extLst>
+          </p:cNvPr>
+          <p:cNvPicPr>
+            <a:picLocks noChangeAspect="1"/>
+          </p:cNvPicPr>
+          <p:nvPr/>
+        </p:nvPicPr>
+        <p:blipFill>
+          <a:blip r:embed="rId10"/>
+          <a:stretch>
+            <a:fillRect/>
+          </a:stretch>
+        </p:blipFill>
+        <p:spPr>
+          <a:xfrm>
+            <a:off x="8546590" y="4558937"/>
+            <a:ext cx="862151" cy="862151"/>
+          </a:xfrm>
+          <a:prstGeom prst="rect">
+            <a:avLst/>
+          </a:prstGeom>
+        </p:spPr>
+      </p:pic>
+      <p:sp>
+        <p:nvSpPr>
+          <p:cNvPr id="24" name="TextBox 23">
+            <a:extLst>
+              <a:ext uri="{FF2B5EF4-FFF2-40B4-BE49-F238E27FC236}">
+                <a16:creationId xmlns:a16="http://schemas.microsoft.com/office/drawing/2014/main" id="{E9C4770E-3930-4100-8769-695CD529C248}"/>
+              </a:ext>
+            </a:extLst>
+          </p:cNvPr>
+          <p:cNvSpPr txBox="1"/>
+          <p:nvPr/>
+        </p:nvSpPr>
+        <p:spPr>
+          <a:xfrm>
+            <a:off x="3919384" y="3435532"/>
+            <a:ext cx="1196555" cy="646331"/>
+          </a:xfrm>
+          <a:prstGeom prst="rect">
+            <a:avLst/>
+          </a:prstGeom>
+          <a:noFill/>
+        </p:spPr>
+        <p:txBody>
+          <a:bodyPr wrap="square" rtlCol="0">
+            <a:spAutoFit/>
+          </a:bodyPr>
+          <a:lstStyle/>
+          <a:p>
+            <a:r>
+              <a:rPr lang="en-US" dirty="0"/>
+              <a:t>Testes A/B</a:t>
+            </a:r>
+          </a:p>
+          <a:p>
+            <a:pPr marL="285750" indent="-285750">
+              <a:buFont typeface="Arial" panose="020B0604020202020204" pitchFamily="34" charset="0"/>
+              <a:buChar char="•"/>
+            </a:pPr>
+            <a:endParaRPr lang="en-US" dirty="0"/>
+          </a:p>
+        </p:txBody>
+      </p:sp>
+      <p:sp>
+        <p:nvSpPr>
+          <p:cNvPr id="25" name="TextBox 24">
+            <a:extLst>
+              <a:ext uri="{FF2B5EF4-FFF2-40B4-BE49-F238E27FC236}">
+                <a16:creationId xmlns:a16="http://schemas.microsoft.com/office/drawing/2014/main" id="{57DD96C5-9E55-46D9-B297-810900388C49}"/>
+              </a:ext>
+            </a:extLst>
+          </p:cNvPr>
+          <p:cNvSpPr txBox="1"/>
+          <p:nvPr/>
+        </p:nvSpPr>
+        <p:spPr>
+          <a:xfrm>
+            <a:off x="3919383" y="5435174"/>
+            <a:ext cx="1196555" cy="646331"/>
+          </a:xfrm>
+          <a:prstGeom prst="rect">
+            <a:avLst/>
+          </a:prstGeom>
+          <a:noFill/>
+        </p:spPr>
+        <p:txBody>
+          <a:bodyPr wrap="square" rtlCol="0">
+            <a:spAutoFit/>
+          </a:bodyPr>
+          <a:lstStyle/>
+          <a:p>
+            <a:r>
+              <a:rPr lang="en-US" dirty="0" err="1"/>
+              <a:t>Estratégico</a:t>
+            </a:r>
+            <a:endParaRPr lang="en-US" dirty="0"/>
+          </a:p>
+          <a:p>
+            <a:pPr marL="285750" indent="-285750">
+              <a:buFont typeface="Arial" panose="020B0604020202020204" pitchFamily="34" charset="0"/>
+              <a:buChar char="•"/>
+            </a:pPr>
+            <a:endParaRPr lang="en-US" dirty="0"/>
+          </a:p>
+        </p:txBody>
+      </p:sp>
+      <p:sp>
+        <p:nvSpPr>
+          <p:cNvPr id="26" name="TextBox 25">
+            <a:extLst>
+              <a:ext uri="{FF2B5EF4-FFF2-40B4-BE49-F238E27FC236}">
+                <a16:creationId xmlns:a16="http://schemas.microsoft.com/office/drawing/2014/main" id="{D038EF2C-5922-4E53-B17C-BDB9C077167A}"/>
+              </a:ext>
+            </a:extLst>
+          </p:cNvPr>
+          <p:cNvSpPr txBox="1"/>
+          <p:nvPr/>
+        </p:nvSpPr>
+        <p:spPr>
+          <a:xfrm>
+            <a:off x="738574" y="5435176"/>
+            <a:ext cx="1433255" cy="646331"/>
+          </a:xfrm>
+          <a:prstGeom prst="rect">
+            <a:avLst/>
+          </a:prstGeom>
+          <a:noFill/>
+        </p:spPr>
+        <p:txBody>
+          <a:bodyPr wrap="square" rtlCol="0">
+            <a:spAutoFit/>
+          </a:bodyPr>
+          <a:lstStyle/>
+          <a:p>
+            <a:r>
+              <a:rPr lang="en-US" dirty="0"/>
+              <a:t>Trunk based</a:t>
+            </a:r>
+          </a:p>
+          <a:p>
+            <a:pPr marL="285750" indent="-285750">
+              <a:buFont typeface="Arial" panose="020B0604020202020204" pitchFamily="34" charset="0"/>
+              <a:buChar char="•"/>
+            </a:pPr>
+            <a:endParaRPr lang="en-US" dirty="0"/>
+          </a:p>
+        </p:txBody>
+      </p:sp>
+      <p:sp>
+        <p:nvSpPr>
+          <p:cNvPr id="27" name="TextBox 26">
+            <a:extLst>
+              <a:ext uri="{FF2B5EF4-FFF2-40B4-BE49-F238E27FC236}">
+                <a16:creationId xmlns:a16="http://schemas.microsoft.com/office/drawing/2014/main" id="{F84D2E36-143A-4C44-9078-0EF4CA5392F0}"/>
+              </a:ext>
+            </a:extLst>
+          </p:cNvPr>
+          <p:cNvSpPr txBox="1"/>
+          <p:nvPr/>
+        </p:nvSpPr>
+        <p:spPr>
+          <a:xfrm>
+            <a:off x="832498" y="3366578"/>
+            <a:ext cx="1433254" cy="646331"/>
+          </a:xfrm>
+          <a:prstGeom prst="rect">
+            <a:avLst/>
+          </a:prstGeom>
+          <a:noFill/>
+        </p:spPr>
+        <p:txBody>
+          <a:bodyPr wrap="square" rtlCol="0">
+            <a:spAutoFit/>
+          </a:bodyPr>
+          <a:lstStyle/>
+          <a:p>
+            <a:r>
+              <a:rPr lang="en-US" dirty="0" err="1"/>
+              <a:t>Ação</a:t>
+            </a:r>
+            <a:r>
+              <a:rPr lang="en-US" dirty="0"/>
+              <a:t> </a:t>
+            </a:r>
+            <a:r>
+              <a:rPr lang="en-US" dirty="0" err="1"/>
+              <a:t>rápida</a:t>
+            </a:r>
+            <a:endParaRPr lang="en-US" dirty="0"/>
+          </a:p>
+          <a:p>
+            <a:pPr marL="285750" indent="-285750">
+              <a:buFont typeface="Arial" panose="020B0604020202020204" pitchFamily="34" charset="0"/>
+              <a:buChar char="•"/>
+            </a:pPr>
+            <a:endParaRPr lang="en-US" dirty="0"/>
+          </a:p>
+        </p:txBody>
+      </p:sp>
+      <p:sp>
+        <p:nvSpPr>
+          <p:cNvPr id="28" name="TextBox 27">
+            <a:extLst>
+              <a:ext uri="{FF2B5EF4-FFF2-40B4-BE49-F238E27FC236}">
+                <a16:creationId xmlns:a16="http://schemas.microsoft.com/office/drawing/2014/main" id="{6FA1F956-DCAF-4E41-9F42-F6BAB3E59B7E}"/>
+              </a:ext>
+            </a:extLst>
+          </p:cNvPr>
+          <p:cNvSpPr txBox="1"/>
+          <p:nvPr/>
+        </p:nvSpPr>
+        <p:spPr>
+          <a:xfrm>
+            <a:off x="2343803" y="4450003"/>
+            <a:ext cx="1352657" cy="646331"/>
+          </a:xfrm>
+          <a:prstGeom prst="rect">
+            <a:avLst/>
+          </a:prstGeom>
+          <a:noFill/>
+        </p:spPr>
+        <p:txBody>
+          <a:bodyPr wrap="square" rtlCol="0">
+            <a:spAutoFit/>
+          </a:bodyPr>
+          <a:lstStyle/>
+          <a:p>
+            <a:r>
+              <a:rPr lang="en-US" dirty="0"/>
+              <a:t>QUALIDADE</a:t>
+            </a:r>
+          </a:p>
+          <a:p>
+            <a:pPr marL="285750" indent="-285750">
+              <a:buFont typeface="Arial" panose="020B0604020202020204" pitchFamily="34" charset="0"/>
+              <a:buChar char="•"/>
+            </a:pPr>
+            <a:endParaRPr lang="en-US" dirty="0"/>
+          </a:p>
+        </p:txBody>
+      </p:sp>
+      <p:sp>
+        <p:nvSpPr>
+          <p:cNvPr id="29" name="TextBox 28">
+            <a:extLst>
+              <a:ext uri="{FF2B5EF4-FFF2-40B4-BE49-F238E27FC236}">
+                <a16:creationId xmlns:a16="http://schemas.microsoft.com/office/drawing/2014/main" id="{D3EE2678-DD2A-4C8C-8674-0C955AEAB4BB}"/>
+              </a:ext>
+            </a:extLst>
+          </p:cNvPr>
+          <p:cNvSpPr txBox="1"/>
+          <p:nvPr/>
+        </p:nvSpPr>
+        <p:spPr>
+          <a:xfrm>
+            <a:off x="6548508" y="3581834"/>
+            <a:ext cx="1515605" cy="646331"/>
+          </a:xfrm>
+          <a:prstGeom prst="rect">
+            <a:avLst/>
+          </a:prstGeom>
+          <a:noFill/>
+        </p:spPr>
+        <p:txBody>
+          <a:bodyPr wrap="square" rtlCol="0">
+            <a:spAutoFit/>
+          </a:bodyPr>
+          <a:lstStyle/>
+          <a:p>
+            <a:r>
+              <a:rPr lang="en-US" dirty="0" err="1"/>
+              <a:t>Débito</a:t>
+            </a:r>
+            <a:r>
+              <a:rPr lang="en-US" dirty="0"/>
+              <a:t> </a:t>
+            </a:r>
+            <a:r>
+              <a:rPr lang="en-US" dirty="0" err="1"/>
+              <a:t>técnico</a:t>
+            </a:r>
+            <a:endParaRPr lang="en-US" dirty="0"/>
+          </a:p>
+          <a:p>
+            <a:pPr marL="285750" indent="-285750">
+              <a:buFont typeface="Arial" panose="020B0604020202020204" pitchFamily="34" charset="0"/>
+              <a:buChar char="•"/>
+            </a:pPr>
+            <a:endParaRPr lang="en-US" dirty="0"/>
+          </a:p>
+        </p:txBody>
+      </p:sp>
+      <p:sp>
+        <p:nvSpPr>
+          <p:cNvPr id="30" name="TextBox 29">
+            <a:extLst>
+              <a:ext uri="{FF2B5EF4-FFF2-40B4-BE49-F238E27FC236}">
+                <a16:creationId xmlns:a16="http://schemas.microsoft.com/office/drawing/2014/main" id="{F96A07F9-E533-4B52-BE37-CDEE6E63F375}"/>
+              </a:ext>
+            </a:extLst>
+          </p:cNvPr>
+          <p:cNvSpPr txBox="1"/>
+          <p:nvPr/>
+        </p:nvSpPr>
+        <p:spPr>
+          <a:xfrm>
+            <a:off x="9171445" y="3581833"/>
+            <a:ext cx="2259852" cy="646331"/>
+          </a:xfrm>
+          <a:prstGeom prst="rect">
+            <a:avLst/>
+          </a:prstGeom>
+          <a:noFill/>
+        </p:spPr>
+        <p:txBody>
+          <a:bodyPr wrap="square" rtlCol="0">
+            <a:spAutoFit/>
+          </a:bodyPr>
+          <a:lstStyle/>
+          <a:p>
+            <a:r>
+              <a:rPr lang="en-US" dirty="0" err="1"/>
+              <a:t>Maior</a:t>
+            </a:r>
+            <a:r>
+              <a:rPr lang="en-US" dirty="0"/>
+              <a:t> </a:t>
+            </a:r>
+            <a:r>
+              <a:rPr lang="en-US" dirty="0" err="1"/>
+              <a:t>gerenciamento</a:t>
+            </a:r>
+            <a:endParaRPr lang="en-US" dirty="0"/>
+          </a:p>
+          <a:p>
+            <a:pPr marL="285750" indent="-285750">
+              <a:buFont typeface="Arial" panose="020B0604020202020204" pitchFamily="34" charset="0"/>
+              <a:buChar char="•"/>
+            </a:pPr>
+            <a:endParaRPr lang="en-US" dirty="0"/>
+          </a:p>
+        </p:txBody>
+      </p:sp>
+      <p:sp>
+        <p:nvSpPr>
+          <p:cNvPr id="31" name="TextBox 30">
+            <a:extLst>
+              <a:ext uri="{FF2B5EF4-FFF2-40B4-BE49-F238E27FC236}">
+                <a16:creationId xmlns:a16="http://schemas.microsoft.com/office/drawing/2014/main" id="{5A159D86-6DEB-419A-B6E4-E42EEC5B876E}"/>
+              </a:ext>
+            </a:extLst>
+          </p:cNvPr>
+          <p:cNvSpPr txBox="1"/>
+          <p:nvPr/>
+        </p:nvSpPr>
+        <p:spPr>
+          <a:xfrm>
+            <a:off x="8139988" y="5414556"/>
+            <a:ext cx="1675354" cy="646331"/>
+          </a:xfrm>
+          <a:prstGeom prst="rect">
+            <a:avLst/>
+          </a:prstGeom>
+          <a:noFill/>
+        </p:spPr>
+        <p:txBody>
+          <a:bodyPr wrap="square" rtlCol="0">
+            <a:spAutoFit/>
+          </a:bodyPr>
+          <a:lstStyle/>
+          <a:p>
+            <a:r>
+              <a:rPr lang="en-US" dirty="0" err="1"/>
+              <a:t>Complexidade</a:t>
+            </a:r>
+            <a:endParaRPr lang="en-US" dirty="0"/>
+          </a:p>
+          <a:p>
+            <a:pPr marL="285750" indent="-285750">
+              <a:buFont typeface="Arial" panose="020B0604020202020204" pitchFamily="34" charset="0"/>
+              <a:buChar char="•"/>
+            </a:pPr>
+            <a:endParaRPr lang="en-US" dirty="0"/>
+          </a:p>
+        </p:txBody>
+      </p:sp>
+    </p:spTree>
+    <p:extLst>
+      <p:ext uri="{BB962C8B-B14F-4D97-AF65-F5344CB8AC3E}">
+        <p14:creationId xmlns:p14="http://schemas.microsoft.com/office/powerpoint/2010/main" val="904197471"/>
+      </p:ext>
+    </p:extLst>
+  </p:cSld>
+  <p:clrMapOvr>
+    <a:masterClrMapping/>
+  </p:clrMapOvr>
+</p:sld>
+</file>
+
+<file path=ppt/slides/slide11.xml><?xml version="1.0" encoding="utf-8"?>
+<p:sld xmlns:a="http://schemas.openxmlformats.org/drawingml/2006/main" xmlns:r="http://schemas.openxmlformats.org/officeDocument/2006/relationships" xmlns:p="http://schemas.openxmlformats.org/presentationml/2006/main">
+  <p:cSld>
+    <p:spTree>
+      <p:nvGrpSpPr>
+        <p:cNvPr id="1" name=""/>
+        <p:cNvGrpSpPr/>
+        <p:nvPr/>
+      </p:nvGrpSpPr>
+      <p:grpSpPr>
+        <a:xfrm>
+          <a:off x="0" y="0"/>
+          <a:ext cx="0" cy="0"/>
+          <a:chOff x="0" y="0"/>
+          <a:chExt cx="0" cy="0"/>
+        </a:xfrm>
+      </p:grpSpPr>
+      <p:sp>
+        <p:nvSpPr>
+          <p:cNvPr id="3" name="Título 2"/>
+          <p:cNvSpPr>
+            <a:spLocks noGrp="1"/>
+          </p:cNvSpPr>
+          <p:nvPr>
+            <p:ph type="title"/>
+          </p:nvPr>
+        </p:nvSpPr>
+        <p:spPr>
+          <a:xfrm>
+            <a:off x="1024128" y="585216"/>
+            <a:ext cx="9720072" cy="1499616"/>
+          </a:xfrm>
+        </p:spPr>
+        <p:txBody>
+          <a:bodyPr>
+            <a:normAutofit/>
+          </a:bodyPr>
+          <a:lstStyle/>
+          <a:p>
+            <a:r>
+              <a:rPr lang="pt-BR" sz="10000" spc="-300" dirty="0">
+                <a:solidFill>
+                  <a:schemeClr val="tx1"/>
+                </a:solidFill>
+              </a:rPr>
+              <a:t>Demo</a:t>
+            </a:r>
+          </a:p>
+        </p:txBody>
+      </p:sp>
+      <p:sp>
+        <p:nvSpPr>
+          <p:cNvPr id="4" name="CaixaDeTexto 3">
+            <a:extLst>
+              <a:ext uri="{FF2B5EF4-FFF2-40B4-BE49-F238E27FC236}">
+                <a16:creationId xmlns:a16="http://schemas.microsoft.com/office/drawing/2014/main" id="{057F1F55-D955-43F8-933C-19B7AF554E3E}"/>
+              </a:ext>
+            </a:extLst>
+          </p:cNvPr>
+          <p:cNvSpPr txBox="1"/>
+          <p:nvPr/>
+        </p:nvSpPr>
+        <p:spPr>
+          <a:xfrm>
+            <a:off x="9596486" y="6380946"/>
+            <a:ext cx="2488676" cy="477054"/>
+          </a:xfrm>
+          <a:prstGeom prst="rect">
+            <a:avLst/>
+          </a:prstGeom>
+          <a:noFill/>
+        </p:spPr>
+        <p:txBody>
+          <a:bodyPr wrap="square" rtlCol="0">
+            <a:spAutoFit/>
+          </a:bodyPr>
+          <a:lstStyle/>
+          <a:p>
+            <a:r>
+              <a:rPr lang="pt-BR" sz="2500" b="1" dirty="0">
+                <a:solidFill>
+                  <a:srgbClr val="67217A"/>
+                </a:solidFill>
+                <a:latin typeface="Verdana" panose="020B0604030504040204" pitchFamily="34" charset="0"/>
+                <a:ea typeface="Verdana" panose="020B0604030504040204" pitchFamily="34" charset="0"/>
+                <a:cs typeface="Verdana" panose="020B0604030504040204" pitchFamily="34" charset="0"/>
+              </a:rPr>
+              <a:t>#VSSUMMIT</a:t>
+            </a:r>
+          </a:p>
+        </p:txBody>
+      </p:sp>
+      <p:sp>
+        <p:nvSpPr>
+          <p:cNvPr id="5" name="Retângulo 4">
+            <a:extLst>
+              <a:ext uri="{FF2B5EF4-FFF2-40B4-BE49-F238E27FC236}">
+                <a16:creationId xmlns:a16="http://schemas.microsoft.com/office/drawing/2014/main" id="{55FCD02A-395C-4BC1-B17F-F2E2A0921C16}"/>
+              </a:ext>
+            </a:extLst>
+          </p:cNvPr>
+          <p:cNvSpPr/>
+          <p:nvPr/>
+        </p:nvSpPr>
+        <p:spPr>
+          <a:xfrm>
+            <a:off x="628203" y="2980378"/>
+            <a:ext cx="4308615" cy="2062103"/>
+          </a:xfrm>
+          <a:prstGeom prst="rect">
+            <a:avLst/>
+          </a:prstGeom>
+        </p:spPr>
+        <p:txBody>
+          <a:bodyPr wrap="none">
+            <a:spAutoFit/>
+          </a:bodyPr>
+          <a:lstStyle/>
+          <a:p>
+            <a:pPr marL="457200" indent="-457200">
+              <a:buFont typeface="Wingdings" panose="05000000000000000000" pitchFamily="2" charset="2"/>
+              <a:buChar char="§"/>
+            </a:pPr>
+            <a:r>
+              <a:rPr lang="pt-BR" sz="3200" dirty="0">
+                <a:solidFill>
+                  <a:srgbClr val="67217A"/>
+                </a:solidFill>
+                <a:latin typeface="Segoe UI Light" panose="020B0502040204020203" pitchFamily="34" charset="0"/>
+                <a:cs typeface="Segoe UI Light" panose="020B0502040204020203" pitchFamily="34" charset="0"/>
+              </a:rPr>
+              <a:t>ASP.NET CORE (MVC)</a:t>
+            </a:r>
+          </a:p>
+          <a:p>
+            <a:pPr marL="457200" indent="-457200">
+              <a:buFont typeface="Wingdings" panose="05000000000000000000" pitchFamily="2" charset="2"/>
+              <a:buChar char="§"/>
+            </a:pPr>
+            <a:r>
+              <a:rPr lang="pt-BR" sz="3200" dirty="0">
+                <a:solidFill>
+                  <a:srgbClr val="67217A"/>
+                </a:solidFill>
+                <a:latin typeface="Segoe UI Light" panose="020B0502040204020203" pitchFamily="34" charset="0"/>
+                <a:cs typeface="Segoe UI Light" panose="020B0502040204020203" pitchFamily="34" charset="0"/>
+              </a:rPr>
+              <a:t>Docker</a:t>
+            </a:r>
+          </a:p>
+          <a:p>
+            <a:pPr marL="457200" indent="-457200">
+              <a:buFont typeface="Wingdings" panose="05000000000000000000" pitchFamily="2" charset="2"/>
+              <a:buChar char="§"/>
+            </a:pPr>
+            <a:r>
+              <a:rPr lang="pt-BR" sz="3200" dirty="0">
+                <a:solidFill>
+                  <a:srgbClr val="67217A"/>
+                </a:solidFill>
+                <a:latin typeface="Segoe UI Light" panose="020B0502040204020203" pitchFamily="34" charset="0"/>
+                <a:cs typeface="Segoe UI Light" panose="020B0502040204020203" pitchFamily="34" charset="0"/>
+              </a:rPr>
+              <a:t>Config Cat</a:t>
+            </a:r>
+          </a:p>
+          <a:p>
+            <a:pPr marL="457200" indent="-457200">
+              <a:buFont typeface="Wingdings" panose="05000000000000000000" pitchFamily="2" charset="2"/>
+              <a:buChar char="§"/>
+            </a:pPr>
+            <a:endParaRPr lang="pt-BR" sz="3200" dirty="0">
+              <a:solidFill>
+                <a:srgbClr val="67217A"/>
+              </a:solidFill>
+              <a:latin typeface="Segoe UI Light" panose="020B0502040204020203" pitchFamily="34" charset="0"/>
+              <a:cs typeface="Segoe UI Light" panose="020B0502040204020203" pitchFamily="34" charset="0"/>
+            </a:endParaRPr>
+          </a:p>
+        </p:txBody>
+      </p:sp>
+    </p:spTree>
+    <p:extLst>
+      <p:ext uri="{BB962C8B-B14F-4D97-AF65-F5344CB8AC3E}">
+        <p14:creationId xmlns:p14="http://schemas.microsoft.com/office/powerpoint/2010/main" val="2330706284"/>
+      </p:ext>
+    </p:extLst>
+  </p:cSld>
+  <p:clrMapOvr>
+    <a:masterClrMapping/>
+  </p:clrMapOvr>
+</p:sld>
+</file>
+
+<file path=ppt/slides/slide12.xml><?xml version="1.0" encoding="utf-8"?>
+<p:sld xmlns:a="http://schemas.openxmlformats.org/drawingml/2006/main" xmlns:r="http://schemas.openxmlformats.org/officeDocument/2006/relationships" xmlns:p="http://schemas.openxmlformats.org/presentationml/2006/main">
+  <p:cSld>
+    <p:spTree>
+      <p:nvGrpSpPr>
+        <p:cNvPr id="1" name=""/>
+        <p:cNvGrpSpPr/>
+        <p:nvPr/>
+      </p:nvGrpSpPr>
+      <p:grpSpPr>
+        <a:xfrm>
+          <a:off x="0" y="0"/>
+          <a:ext cx="0" cy="0"/>
+          <a:chOff x="0" y="0"/>
+          <a:chExt cx="0" cy="0"/>
+        </a:xfrm>
+      </p:grpSpPr>
+      <p:sp>
+        <p:nvSpPr>
+          <p:cNvPr id="2" name="Título 1"/>
+          <p:cNvSpPr>
+            <a:spLocks noGrp="1"/>
+          </p:cNvSpPr>
+          <p:nvPr>
+            <p:ph type="ctrTitle"/>
+          </p:nvPr>
+        </p:nvSpPr>
+        <p:spPr>
+          <a:xfrm>
+            <a:off x="106838" y="5051716"/>
+            <a:ext cx="7772400" cy="1463040"/>
+          </a:xfrm>
+        </p:spPr>
+        <p:txBody>
+          <a:bodyPr>
+            <a:normAutofit fontScale="90000"/>
+          </a:bodyPr>
+          <a:lstStyle/>
+          <a:p>
+            <a:pPr algn="l"/>
+            <a:r>
+              <a:rPr lang="pt-BR" sz="6000" spc="-150" dirty="0"/>
+              <a:t>Albert TAnure</a:t>
+            </a:r>
+            <a:br>
+              <a:rPr lang="pt-BR" sz="6000" spc="-150" dirty="0"/>
+            </a:br>
+            <a:r>
+              <a:rPr lang="pt-BR" sz="4400" spc="-150" dirty="0"/>
+              <a:t>Microsoft MVP</a:t>
+            </a:r>
+            <a:br>
+              <a:rPr lang="pt-BR" sz="4400" spc="-150" dirty="0"/>
+            </a:br>
+            <a:r>
+              <a:rPr lang="pt-BR" sz="4400" spc="-150" dirty="0"/>
+              <a:t>tanure@live.com</a:t>
+            </a:r>
+            <a:endParaRPr lang="pt-BR" sz="3000" spc="-150" dirty="0">
+              <a:latin typeface="+mn-lt"/>
+            </a:endParaRPr>
+          </a:p>
+        </p:txBody>
+      </p:sp>
+      <p:cxnSp>
+        <p:nvCxnSpPr>
+          <p:cNvPr id="7" name="Straight Connector 7"/>
+          <p:cNvCxnSpPr/>
+          <p:nvPr/>
+        </p:nvCxnSpPr>
+        <p:spPr>
+          <a:xfrm flipV="1">
+            <a:off x="6618055" y="5326036"/>
+            <a:ext cx="0" cy="914400"/>
+          </a:xfrm>
+          <a:prstGeom prst="line">
+            <a:avLst/>
+          </a:prstGeom>
+          <a:ln w="19050">
+            <a:solidFill>
+              <a:srgbClr val="67217A"/>
+            </a:solidFill>
+          </a:ln>
+        </p:spPr>
+        <p:style>
+          <a:lnRef idx="1">
+            <a:schemeClr val="accent1"/>
+          </a:lnRef>
+          <a:fillRef idx="0">
+            <a:schemeClr val="accent1"/>
+          </a:fillRef>
+          <a:effectRef idx="0">
+            <a:schemeClr val="accent1"/>
+          </a:effectRef>
+          <a:fontRef idx="minor">
+            <a:schemeClr val="tx1"/>
+          </a:fontRef>
+        </p:style>
+      </p:cxnSp>
+      <p:pic>
+        <p:nvPicPr>
+          <p:cNvPr id="3" name="Imagem 2"/>
+          <p:cNvPicPr>
+            <a:picLocks noChangeAspect="1"/>
+          </p:cNvPicPr>
+          <p:nvPr/>
+        </p:nvPicPr>
+        <p:blipFill rotWithShape="1">
+          <a:blip r:embed="rId2"/>
+          <a:srcRect r="18374"/>
+          <a:stretch/>
+        </p:blipFill>
+        <p:spPr>
+          <a:xfrm>
+            <a:off x="6929448" y="5421302"/>
+            <a:ext cx="4901069" cy="723867"/>
+          </a:xfrm>
+          <a:prstGeom prst="rect">
+            <a:avLst/>
+          </a:prstGeom>
+        </p:spPr>
+      </p:pic>
+      <p:sp>
+        <p:nvSpPr>
+          <p:cNvPr id="8" name="CaixaDeTexto 7"/>
+          <p:cNvSpPr txBox="1"/>
+          <p:nvPr/>
+        </p:nvSpPr>
+        <p:spPr>
+          <a:xfrm>
+            <a:off x="9775595" y="6380946"/>
+            <a:ext cx="2488676" cy="477054"/>
+          </a:xfrm>
+          <a:prstGeom prst="rect">
+            <a:avLst/>
+          </a:prstGeom>
+          <a:noFill/>
+        </p:spPr>
+        <p:txBody>
+          <a:bodyPr wrap="square" rtlCol="0">
+            <a:spAutoFit/>
+          </a:bodyPr>
+          <a:lstStyle/>
+          <a:p>
+            <a:r>
+              <a:rPr lang="pt-BR" sz="2500" b="1" dirty="0">
+                <a:solidFill>
+                  <a:srgbClr val="67217A"/>
+                </a:solidFill>
+                <a:latin typeface="Verdana" panose="020B0604030504040204" pitchFamily="34" charset="0"/>
+                <a:ea typeface="Verdana" panose="020B0604030504040204" pitchFamily="34" charset="0"/>
+                <a:cs typeface="Verdana" panose="020B0604030504040204" pitchFamily="34" charset="0"/>
+              </a:rPr>
+              <a:t>#VSSUMMIT</a:t>
+            </a:r>
+          </a:p>
+        </p:txBody>
+      </p:sp>
+      <p:sp>
+        <p:nvSpPr>
+          <p:cNvPr id="9" name="Espaço Reservado para Conteúdo 3">
+            <a:extLst>
+              <a:ext uri="{FF2B5EF4-FFF2-40B4-BE49-F238E27FC236}">
+                <a16:creationId xmlns:a16="http://schemas.microsoft.com/office/drawing/2014/main" id="{F40C3102-DE54-4871-AA50-E1EBDB38DBD4}"/>
+              </a:ext>
+            </a:extLst>
+          </p:cNvPr>
+          <p:cNvSpPr txBox="1">
+            <a:spLocks/>
+          </p:cNvSpPr>
+          <p:nvPr/>
+        </p:nvSpPr>
+        <p:spPr>
+          <a:xfrm>
+            <a:off x="3320667" y="1800262"/>
+            <a:ext cx="7209461" cy="621897"/>
+          </a:xfrm>
+          <a:prstGeom prst="rect">
+            <a:avLst/>
+          </a:prstGeom>
+        </p:spPr>
+        <p:txBody>
+          <a:bodyPr vert="horz" lIns="45720" tIns="45720" rIns="45720" bIns="45720" rtlCol="0">
+            <a:noAutofit/>
+          </a:bodyPr>
+          <a:lstStyle>
+            <a:lvl1pPr marL="91440" indent="-91440" algn="l" defTabSz="914400" rtl="0" eaLnBrk="1" latinLnBrk="0" hangingPunct="1">
+              <a:lnSpc>
+                <a:spcPct val="90000"/>
+              </a:lnSpc>
+              <a:spcBef>
+                <a:spcPts val="1200"/>
+              </a:spcBef>
+              <a:spcAft>
+                <a:spcPts val="200"/>
+              </a:spcAft>
+              <a:buClr>
+                <a:schemeClr val="accent2"/>
+              </a:buClr>
+              <a:buSzPct val="100000"/>
+              <a:buFont typeface="Tw Cen MT" panose="020B0602020104020603" pitchFamily="34" charset="0"/>
+              <a:buChar char=" "/>
+              <a:defRPr sz="2200" kern="1200">
+                <a:solidFill>
+                  <a:schemeClr val="tx1"/>
+                </a:solidFill>
+                <a:latin typeface="+mn-lt"/>
+                <a:ea typeface="+mn-ea"/>
+                <a:cs typeface="+mn-cs"/>
+              </a:defRPr>
+            </a:lvl1pPr>
+            <a:lvl2pPr marL="265176" indent="-137160" algn="l" defTabSz="914400" rtl="0" eaLnBrk="1" latinLnBrk="0" hangingPunct="1">
+              <a:lnSpc>
+                <a:spcPct val="90000"/>
+              </a:lnSpc>
+              <a:spcBef>
+                <a:spcPts val="200"/>
+              </a:spcBef>
+              <a:spcAft>
+                <a:spcPts val="400"/>
+              </a:spcAft>
+              <a:buClr>
+                <a:schemeClr val="accent2"/>
+              </a:buClr>
+              <a:buFont typeface="Wingdings 3" pitchFamily="18" charset="2"/>
+              <a:buChar char=""/>
+              <a:defRPr sz="1800" kern="1200">
+                <a:solidFill>
+                  <a:schemeClr val="tx1"/>
+                </a:solidFill>
+                <a:latin typeface="+mn-lt"/>
+                <a:ea typeface="+mn-ea"/>
+                <a:cs typeface="+mn-cs"/>
+              </a:defRPr>
+            </a:lvl2pPr>
+            <a:lvl3pPr marL="448056" indent="-137160" algn="l" defTabSz="914400" rtl="0" eaLnBrk="1" latinLnBrk="0" hangingPunct="1">
+              <a:lnSpc>
+                <a:spcPct val="90000"/>
+              </a:lnSpc>
+              <a:spcBef>
+                <a:spcPts val="200"/>
+              </a:spcBef>
+              <a:spcAft>
+                <a:spcPts val="400"/>
+              </a:spcAft>
+              <a:buClr>
+                <a:schemeClr val="accent2"/>
+              </a:buClr>
+              <a:buFont typeface="Wingdings 3" pitchFamily="18" charset="2"/>
+              <a:buChar char=""/>
+              <a:defRPr sz="1400" kern="1200">
+                <a:solidFill>
+                  <a:schemeClr val="tx1"/>
+                </a:solidFill>
+                <a:latin typeface="+mn-lt"/>
+                <a:ea typeface="+mn-ea"/>
+                <a:cs typeface="+mn-cs"/>
+              </a:defRPr>
+            </a:lvl3pPr>
+            <a:lvl4pPr marL="594360" indent="-137160" algn="l" defTabSz="914400" rtl="0" eaLnBrk="1" latinLnBrk="0" hangingPunct="1">
+              <a:lnSpc>
+                <a:spcPct val="90000"/>
+              </a:lnSpc>
+              <a:spcBef>
+                <a:spcPts val="200"/>
+              </a:spcBef>
+              <a:spcAft>
+                <a:spcPts val="400"/>
+              </a:spcAft>
+              <a:buClr>
+                <a:schemeClr val="accent2"/>
+              </a:buClr>
+              <a:buFont typeface="Wingdings 3" pitchFamily="18" charset="2"/>
+              <a:buChar char=""/>
+              <a:defRPr sz="1400" kern="1200">
+                <a:solidFill>
+                  <a:schemeClr val="tx1"/>
+                </a:solidFill>
+                <a:latin typeface="+mn-lt"/>
+                <a:ea typeface="+mn-ea"/>
+                <a:cs typeface="+mn-cs"/>
+              </a:defRPr>
+            </a:lvl4pPr>
+            <a:lvl5pPr marL="777240" indent="-137160" algn="l" defTabSz="914400" rtl="0" eaLnBrk="1" latinLnBrk="0" hangingPunct="1">
+              <a:lnSpc>
+                <a:spcPct val="90000"/>
+              </a:lnSpc>
+              <a:spcBef>
+                <a:spcPts val="200"/>
+              </a:spcBef>
+              <a:spcAft>
+                <a:spcPts val="400"/>
+              </a:spcAft>
+              <a:buClr>
+                <a:schemeClr val="accent2"/>
+              </a:buClr>
+              <a:buFont typeface="Wingdings 3" pitchFamily="18" charset="2"/>
+              <a:buChar char=""/>
+              <a:defRPr sz="1400" kern="1200">
+                <a:solidFill>
+                  <a:schemeClr val="tx1"/>
+                </a:solidFill>
+                <a:latin typeface="+mn-lt"/>
+                <a:ea typeface="+mn-ea"/>
+                <a:cs typeface="+mn-cs"/>
+              </a:defRPr>
+            </a:lvl5pPr>
+            <a:lvl6pPr marL="914400" indent="-137160" algn="l" defTabSz="914400" rtl="0" eaLnBrk="1" latinLnBrk="0" hangingPunct="1">
+              <a:lnSpc>
+                <a:spcPct val="90000"/>
+              </a:lnSpc>
+              <a:spcBef>
+                <a:spcPts val="200"/>
+              </a:spcBef>
+              <a:spcAft>
+                <a:spcPts val="400"/>
+              </a:spcAft>
+              <a:buClr>
+                <a:schemeClr val="accent2"/>
+              </a:buClr>
+              <a:buFont typeface="Wingdings 3" pitchFamily="18" charset="2"/>
+              <a:buChar char=""/>
+              <a:defRPr sz="1400" kern="1200">
+                <a:solidFill>
+                  <a:schemeClr val="tx1"/>
+                </a:solidFill>
+                <a:latin typeface="+mn-lt"/>
+                <a:ea typeface="+mn-ea"/>
+                <a:cs typeface="+mn-cs"/>
+              </a:defRPr>
+            </a:lvl6pPr>
+            <a:lvl7pPr marL="1060704" indent="-137160" algn="l" defTabSz="914400" rtl="0" eaLnBrk="1" latinLnBrk="0" hangingPunct="1">
+              <a:lnSpc>
+                <a:spcPct val="90000"/>
+              </a:lnSpc>
+              <a:spcBef>
+                <a:spcPts val="200"/>
+              </a:spcBef>
+              <a:spcAft>
+                <a:spcPts val="400"/>
+              </a:spcAft>
+              <a:buClr>
+                <a:schemeClr val="accent2"/>
+              </a:buClr>
+              <a:buFont typeface="Wingdings 3" pitchFamily="18" charset="2"/>
+              <a:buChar char=""/>
+              <a:defRPr sz="1400" kern="1200">
+                <a:solidFill>
+                  <a:schemeClr val="tx1"/>
+                </a:solidFill>
+                <a:latin typeface="+mn-lt"/>
+                <a:ea typeface="+mn-ea"/>
+                <a:cs typeface="+mn-cs"/>
+              </a:defRPr>
+            </a:lvl7pPr>
+            <a:lvl8pPr marL="1216152" indent="-137160" algn="l" defTabSz="914400" rtl="0" eaLnBrk="1" latinLnBrk="0" hangingPunct="1">
+              <a:lnSpc>
+                <a:spcPct val="90000"/>
+              </a:lnSpc>
+              <a:spcBef>
+                <a:spcPts val="200"/>
+              </a:spcBef>
+              <a:spcAft>
+                <a:spcPts val="400"/>
+              </a:spcAft>
+              <a:buClr>
+                <a:schemeClr val="accent2"/>
+              </a:buClr>
+              <a:buFont typeface="Wingdings 3" pitchFamily="18" charset="2"/>
+              <a:buChar char=""/>
+              <a:defRPr sz="1400" kern="1200">
+                <a:solidFill>
+                  <a:schemeClr val="tx1"/>
+                </a:solidFill>
+                <a:latin typeface="+mn-lt"/>
+                <a:ea typeface="+mn-ea"/>
+                <a:cs typeface="+mn-cs"/>
+              </a:defRPr>
+            </a:lvl8pPr>
+            <a:lvl9pPr marL="1362456" indent="-137160" algn="l" defTabSz="914400" rtl="0" eaLnBrk="1" latinLnBrk="0" hangingPunct="1">
+              <a:lnSpc>
+                <a:spcPct val="90000"/>
+              </a:lnSpc>
+              <a:spcBef>
+                <a:spcPts val="200"/>
+              </a:spcBef>
+              <a:spcAft>
+                <a:spcPts val="400"/>
+              </a:spcAft>
+              <a:buClr>
+                <a:schemeClr val="accent2"/>
+              </a:buClr>
+              <a:buFont typeface="Wingdings 3" pitchFamily="18" charset="2"/>
+              <a:buChar char=""/>
+              <a:defRPr sz="1400" kern="1200">
+                <a:solidFill>
+                  <a:schemeClr val="tx1"/>
+                </a:solidFill>
+                <a:latin typeface="+mn-lt"/>
+                <a:ea typeface="+mn-ea"/>
+                <a:cs typeface="+mn-cs"/>
+              </a:defRPr>
+            </a:lvl9pPr>
+          </a:lstStyle>
+          <a:p>
+            <a:r>
+              <a:rPr lang="pt-BR" sz="6600" spc="-300" dirty="0">
+                <a:solidFill>
+                  <a:schemeClr val="bg1"/>
+                </a:solidFill>
+                <a:latin typeface="+mj-lt"/>
+              </a:rPr>
+              <a:t>MUITO OBRIGADO!</a:t>
+            </a:r>
+          </a:p>
+        </p:txBody>
+      </p:sp>
+      <p:pic>
+        <p:nvPicPr>
+          <p:cNvPr id="11" name="Picture 10" descr="A picture containing object&#10;&#10;Description automatically generated">
+            <a:extLst>
+              <a:ext uri="{FF2B5EF4-FFF2-40B4-BE49-F238E27FC236}">
+                <a16:creationId xmlns:a16="http://schemas.microsoft.com/office/drawing/2014/main" id="{99642CF2-B601-4950-90B3-ABB26CEBE840}"/>
+              </a:ext>
+            </a:extLst>
+          </p:cNvPr>
+          <p:cNvPicPr>
+            <a:picLocks noChangeAspect="1"/>
+          </p:cNvPicPr>
+          <p:nvPr/>
+        </p:nvPicPr>
+        <p:blipFill>
+          <a:blip r:embed="rId3"/>
+          <a:stretch>
+            <a:fillRect/>
+          </a:stretch>
+        </p:blipFill>
+        <p:spPr>
+          <a:xfrm>
+            <a:off x="9126120" y="53801"/>
+            <a:ext cx="2835026" cy="3681754"/>
+          </a:xfrm>
+          <a:prstGeom prst="rect">
+            <a:avLst/>
+          </a:prstGeom>
+        </p:spPr>
+      </p:pic>
+      <p:sp>
+        <p:nvSpPr>
+          <p:cNvPr id="12" name="Título 1">
+            <a:extLst>
+              <a:ext uri="{FF2B5EF4-FFF2-40B4-BE49-F238E27FC236}">
+                <a16:creationId xmlns:a16="http://schemas.microsoft.com/office/drawing/2014/main" id="{608EFFAB-AB7D-4857-89FA-3AF3A94406F9}"/>
+              </a:ext>
+            </a:extLst>
+          </p:cNvPr>
+          <p:cNvSpPr txBox="1">
+            <a:spLocks/>
+          </p:cNvSpPr>
+          <p:nvPr/>
+        </p:nvSpPr>
+        <p:spPr>
+          <a:xfrm>
+            <a:off x="9233613" y="3889586"/>
+            <a:ext cx="2620039" cy="431110"/>
+          </a:xfrm>
+          <a:prstGeom prst="rect">
+            <a:avLst/>
+          </a:prstGeom>
+        </p:spPr>
+        <p:txBody>
+          <a:bodyPr vert="horz" lIns="91440" tIns="45720" rIns="91440" bIns="45720" rtlCol="0" anchor="ctr">
+            <a:normAutofit/>
+          </a:bodyPr>
+          <a:lstStyle>
+            <a:lvl1pPr algn="r" defTabSz="914400" rtl="0" eaLnBrk="1" latinLnBrk="0" hangingPunct="1">
+              <a:lnSpc>
+                <a:spcPct val="80000"/>
+              </a:lnSpc>
+              <a:spcBef>
+                <a:spcPct val="0"/>
+              </a:spcBef>
+              <a:buNone/>
+              <a:defRPr sz="5000" kern="1200" cap="all" spc="200" baseline="0">
+                <a:solidFill>
+                  <a:schemeClr val="tx1">
+                    <a:lumMod val="90000"/>
+                    <a:lumOff val="10000"/>
+                  </a:schemeClr>
+                </a:solidFill>
+                <a:latin typeface="+mj-lt"/>
+                <a:ea typeface="+mj-ea"/>
+                <a:cs typeface="+mj-cs"/>
+              </a:defRPr>
+            </a:lvl1pPr>
+          </a:lstStyle>
+          <a:p>
+            <a:pPr algn="l"/>
+            <a:r>
+              <a:rPr lang="pt-BR" sz="2000" spc="-150" dirty="0">
+                <a:solidFill>
+                  <a:schemeClr val="bg1"/>
+                </a:solidFill>
+                <a:latin typeface="+mn-lt"/>
+              </a:rPr>
+              <a:t>https://bit.ly/31LCvQp</a:t>
+            </a:r>
+            <a:endParaRPr lang="pt-BR" sz="1600" spc="-150" dirty="0">
+              <a:solidFill>
+                <a:schemeClr val="bg1"/>
+              </a:solidFill>
+              <a:latin typeface="+mn-lt"/>
+            </a:endParaRPr>
+          </a:p>
+        </p:txBody>
+      </p:sp>
+    </p:spTree>
+    <p:extLst>
+      <p:ext uri="{BB962C8B-B14F-4D97-AF65-F5344CB8AC3E}">
+        <p14:creationId xmlns:p14="http://schemas.microsoft.com/office/powerpoint/2010/main" val="1100175642"/>
+      </p:ext>
+    </p:extLst>
+  </p:cSld>
+  <p:clrMapOvr>
+    <a:masterClrMapping/>
+  </p:clrMapOvr>
+</p:sld>
+</file>
+
 <file path=ppt/slides/slide2.xml><?xml version="1.0" encoding="utf-8"?>
+<p:sld xmlns:a="http://schemas.openxmlformats.org/drawingml/2006/main" xmlns:r="http://schemas.openxmlformats.org/officeDocument/2006/relationships" xmlns:p="http://schemas.openxmlformats.org/presentationml/2006/main">
+  <p:cSld>
+    <p:bg>
+      <p:bgPr>
+        <a:solidFill>
+          <a:schemeClr val="bg1"/>
+        </a:solidFill>
+        <a:effectLst/>
+      </p:bgPr>
+    </p:bg>
+    <p:spTree>
+      <p:nvGrpSpPr>
+        <p:cNvPr id="1" name=""/>
+        <p:cNvGrpSpPr/>
+        <p:nvPr/>
+      </p:nvGrpSpPr>
+      <p:grpSpPr>
+        <a:xfrm>
+          <a:off x="0" y="0"/>
+          <a:ext cx="0" cy="0"/>
+          <a:chOff x="0" y="0"/>
+          <a:chExt cx="0" cy="0"/>
+        </a:xfrm>
+      </p:grpSpPr>
+      <p:sp>
+        <p:nvSpPr>
+          <p:cNvPr id="2" name="Title 1">
+            <a:extLst>
+              <a:ext uri="{FF2B5EF4-FFF2-40B4-BE49-F238E27FC236}">
+                <a16:creationId xmlns:a16="http://schemas.microsoft.com/office/drawing/2014/main" id="{A8473D80-246C-487A-B936-6CC0FE7F337A}"/>
+              </a:ext>
+            </a:extLst>
+          </p:cNvPr>
+          <p:cNvSpPr>
+            <a:spLocks noGrp="1"/>
+          </p:cNvSpPr>
+          <p:nvPr>
+            <p:ph type="title"/>
+          </p:nvPr>
+        </p:nvSpPr>
+        <p:spPr>
+          <a:xfrm>
+            <a:off x="1024128" y="585216"/>
+            <a:ext cx="6066818" cy="1499616"/>
+          </a:xfrm>
+        </p:spPr>
+        <p:txBody>
+          <a:bodyPr>
+            <a:normAutofit/>
+          </a:bodyPr>
+          <a:lstStyle/>
+          <a:p>
+            <a:r>
+              <a:rPr lang="en-US" dirty="0"/>
+              <a:t>Albert </a:t>
+            </a:r>
+            <a:r>
+              <a:rPr lang="en-US" dirty="0" err="1"/>
+              <a:t>tanure</a:t>
+            </a:r>
+            <a:endParaRPr lang="en-US" dirty="0"/>
+          </a:p>
+        </p:txBody>
+      </p:sp>
+      <p:sp>
+        <p:nvSpPr>
+          <p:cNvPr id="3" name="Content Placeholder 2">
+            <a:extLst>
+              <a:ext uri="{FF2B5EF4-FFF2-40B4-BE49-F238E27FC236}">
+                <a16:creationId xmlns:a16="http://schemas.microsoft.com/office/drawing/2014/main" id="{A43ABECF-162D-443C-B5CB-E3361C181386}"/>
+              </a:ext>
+            </a:extLst>
+          </p:cNvPr>
+          <p:cNvSpPr>
+            <a:spLocks noGrp="1"/>
+          </p:cNvSpPr>
+          <p:nvPr>
+            <p:ph idx="1"/>
+          </p:nvPr>
+        </p:nvSpPr>
+        <p:spPr>
+          <a:xfrm>
+            <a:off x="1024128" y="2286000"/>
+            <a:ext cx="6066818" cy="4023360"/>
+          </a:xfrm>
+        </p:spPr>
+        <p:txBody>
+          <a:bodyPr>
+            <a:normAutofit/>
+          </a:bodyPr>
+          <a:lstStyle/>
+          <a:p>
+            <a:r>
+              <a:rPr lang="en-US" dirty="0"/>
+              <a:t>tanure@live.com</a:t>
+            </a:r>
+            <a:br>
+              <a:rPr lang="en-US" dirty="0"/>
+            </a:br>
+            <a:r>
+              <a:rPr lang="en-US" dirty="0"/>
+              <a:t>#</a:t>
+            </a:r>
+            <a:r>
+              <a:rPr lang="en-US" dirty="0" err="1"/>
+              <a:t>simplificandoconceitos</a:t>
+            </a:r>
+            <a:br>
+              <a:rPr lang="en-US" dirty="0"/>
+            </a:br>
+            <a:r>
+              <a:rPr lang="en-US" dirty="0"/>
+              <a:t>https://linkedin.com/in/albert-tanure</a:t>
+            </a:r>
+          </a:p>
+        </p:txBody>
+      </p:sp>
+      <p:grpSp>
+        <p:nvGrpSpPr>
+          <p:cNvPr id="7" name="Image">
+            <a:extLst>
+              <a:ext uri="{FF2B5EF4-FFF2-40B4-BE49-F238E27FC236}">
+                <a16:creationId xmlns:a16="http://schemas.microsoft.com/office/drawing/2014/main" id="{441D31BD-C0AC-4CA3-9718-70051320FCC1}"/>
+              </a:ext>
+            </a:extLst>
+          </p:cNvPr>
+          <p:cNvGrpSpPr/>
+          <p:nvPr/>
+        </p:nvGrpSpPr>
+        <p:grpSpPr>
+          <a:xfrm>
+            <a:off x="637608" y="4373189"/>
+            <a:ext cx="2194323" cy="976003"/>
+            <a:chOff x="0" y="0"/>
+            <a:chExt cx="4140200" cy="1841500"/>
+          </a:xfrm>
+        </p:grpSpPr>
+        <p:pic>
+          <p:nvPicPr>
+            <p:cNvPr id="8" name="Image" descr="Image">
+              <a:extLst>
+                <a:ext uri="{FF2B5EF4-FFF2-40B4-BE49-F238E27FC236}">
+                  <a16:creationId xmlns:a16="http://schemas.microsoft.com/office/drawing/2014/main" id="{ADD52E27-73A1-451E-A383-64164E3AF402}"/>
+                </a:ext>
+              </a:extLst>
+            </p:cNvPr>
+            <p:cNvPicPr>
+              <a:picLocks noChangeAspect="1"/>
+            </p:cNvPicPr>
+            <p:nvPr/>
+          </p:nvPicPr>
+          <p:blipFill>
+            <a:blip r:embed="rId2"/>
+            <a:stretch>
+              <a:fillRect/>
+            </a:stretch>
+          </p:blipFill>
+          <p:spPr>
+            <a:xfrm>
+              <a:off x="88900" y="50800"/>
+              <a:ext cx="3962400" cy="1600200"/>
+            </a:xfrm>
+            <a:prstGeom prst="rect">
+              <a:avLst/>
+            </a:prstGeom>
+            <a:ln>
+              <a:noFill/>
+            </a:ln>
+            <a:effectLst/>
+          </p:spPr>
+        </p:pic>
+        <p:pic>
+          <p:nvPicPr>
+            <p:cNvPr id="10" name="Image" descr="Image">
+              <a:extLst>
+                <a:ext uri="{FF2B5EF4-FFF2-40B4-BE49-F238E27FC236}">
+                  <a16:creationId xmlns:a16="http://schemas.microsoft.com/office/drawing/2014/main" id="{92BA78C6-ACA1-4840-8A5B-6AC313769721}"/>
+                </a:ext>
+              </a:extLst>
+            </p:cNvPr>
+            <p:cNvPicPr>
+              <a:picLocks/>
+            </p:cNvPicPr>
+            <p:nvPr/>
+          </p:nvPicPr>
+          <p:blipFill>
+            <a:blip r:embed="rId3"/>
+            <a:stretch>
+              <a:fillRect/>
+            </a:stretch>
+          </p:blipFill>
+          <p:spPr>
+            <a:xfrm>
+              <a:off x="0" y="0"/>
+              <a:ext cx="4140200" cy="1841500"/>
+            </a:xfrm>
+            <a:prstGeom prst="rect">
+              <a:avLst/>
+            </a:prstGeom>
+            <a:effectLst/>
+          </p:spPr>
+        </p:pic>
+      </p:grpSp>
+      <p:grpSp>
+        <p:nvGrpSpPr>
+          <p:cNvPr id="12" name="Image">
+            <a:extLst>
+              <a:ext uri="{FF2B5EF4-FFF2-40B4-BE49-F238E27FC236}">
+                <a16:creationId xmlns:a16="http://schemas.microsoft.com/office/drawing/2014/main" id="{F9CB8059-8D54-464A-A94D-EAF370EA542D}"/>
+              </a:ext>
+            </a:extLst>
+          </p:cNvPr>
+          <p:cNvGrpSpPr/>
+          <p:nvPr/>
+        </p:nvGrpSpPr>
+        <p:grpSpPr>
+          <a:xfrm>
+            <a:off x="4639735" y="4373189"/>
+            <a:ext cx="2498598" cy="938465"/>
+            <a:chOff x="0" y="0"/>
+            <a:chExt cx="4038600" cy="1587500"/>
+          </a:xfrm>
+        </p:grpSpPr>
+        <p:pic>
+          <p:nvPicPr>
+            <p:cNvPr id="13" name="Image" descr="Image">
+              <a:extLst>
+                <a:ext uri="{FF2B5EF4-FFF2-40B4-BE49-F238E27FC236}">
+                  <a16:creationId xmlns:a16="http://schemas.microsoft.com/office/drawing/2014/main" id="{E9B7DEBF-8688-46FC-A29D-B57751563CC7}"/>
+                </a:ext>
+              </a:extLst>
+            </p:cNvPr>
+            <p:cNvPicPr>
+              <a:picLocks noChangeAspect="1"/>
+            </p:cNvPicPr>
+            <p:nvPr/>
+          </p:nvPicPr>
+          <p:blipFill>
+            <a:blip r:embed="rId4"/>
+            <a:srcRect/>
+            <a:stretch>
+              <a:fillRect/>
+            </a:stretch>
+          </p:blipFill>
+          <p:spPr>
+            <a:xfrm>
+              <a:off x="88900" y="50800"/>
+              <a:ext cx="3860800" cy="1346200"/>
+            </a:xfrm>
+            <a:prstGeom prst="rect">
+              <a:avLst/>
+            </a:prstGeom>
+            <a:ln>
+              <a:noFill/>
+            </a:ln>
+            <a:effectLst/>
+          </p:spPr>
+        </p:pic>
+        <p:pic>
+          <p:nvPicPr>
+            <p:cNvPr id="14" name="Image" descr="Image">
+              <a:extLst>
+                <a:ext uri="{FF2B5EF4-FFF2-40B4-BE49-F238E27FC236}">
+                  <a16:creationId xmlns:a16="http://schemas.microsoft.com/office/drawing/2014/main" id="{393B59AA-FEAE-4991-9A24-C49A2A8606D6}"/>
+                </a:ext>
+              </a:extLst>
+            </p:cNvPr>
+            <p:cNvPicPr>
+              <a:picLocks/>
+            </p:cNvPicPr>
+            <p:nvPr/>
+          </p:nvPicPr>
+          <p:blipFill>
+            <a:blip r:embed="rId5"/>
+            <a:stretch>
+              <a:fillRect/>
+            </a:stretch>
+          </p:blipFill>
+          <p:spPr>
+            <a:xfrm>
+              <a:off x="0" y="0"/>
+              <a:ext cx="4038600" cy="1587500"/>
+            </a:xfrm>
+            <a:prstGeom prst="rect">
+              <a:avLst/>
+            </a:prstGeom>
+            <a:effectLst/>
+          </p:spPr>
+        </p:pic>
+      </p:grpSp>
+      <p:pic>
+        <p:nvPicPr>
+          <p:cNvPr id="15" name="Image" descr="Image">
+            <a:extLst>
+              <a:ext uri="{FF2B5EF4-FFF2-40B4-BE49-F238E27FC236}">
+                <a16:creationId xmlns:a16="http://schemas.microsoft.com/office/drawing/2014/main" id="{9DCB9C39-EF74-44E5-8152-663B6451BD0A}"/>
+              </a:ext>
+            </a:extLst>
+          </p:cNvPr>
+          <p:cNvPicPr>
+            <a:picLocks noChangeAspect="1"/>
+          </p:cNvPicPr>
+          <p:nvPr/>
+        </p:nvPicPr>
+        <p:blipFill>
+          <a:blip r:embed="rId6"/>
+          <a:stretch>
+            <a:fillRect/>
+          </a:stretch>
+        </p:blipFill>
+        <p:spPr>
+          <a:xfrm>
+            <a:off x="3003680" y="3782921"/>
+            <a:ext cx="1460396" cy="1234383"/>
+          </a:xfrm>
+          <a:prstGeom prst="rect">
+            <a:avLst/>
+          </a:prstGeom>
+          <a:ln w="25400">
+            <a:miter lim="400000"/>
+          </a:ln>
+          <a:effectLst>
+            <a:outerShdw blurRad="127000" dist="76200" dir="5520000" rotWithShape="0">
+              <a:srgbClr val="000000">
+                <a:alpha val="60000"/>
+              </a:srgbClr>
+            </a:outerShdw>
+          </a:effectLst>
+        </p:spPr>
+      </p:pic>
+      <p:pic>
+        <p:nvPicPr>
+          <p:cNvPr id="16" name="Picture 15">
+            <a:extLst>
+              <a:ext uri="{FF2B5EF4-FFF2-40B4-BE49-F238E27FC236}">
+                <a16:creationId xmlns:a16="http://schemas.microsoft.com/office/drawing/2014/main" id="{4419720E-2D51-47F3-B070-879756A843CD}"/>
+              </a:ext>
+            </a:extLst>
+          </p:cNvPr>
+          <p:cNvPicPr>
+            <a:picLocks noChangeAspect="1"/>
+          </p:cNvPicPr>
+          <p:nvPr/>
+        </p:nvPicPr>
+        <p:blipFill>
+          <a:blip r:embed="rId7"/>
+          <a:stretch>
+            <a:fillRect/>
+          </a:stretch>
+        </p:blipFill>
+        <p:spPr>
+          <a:xfrm>
+            <a:off x="3776246" y="5512822"/>
+            <a:ext cx="3314700" cy="1016000"/>
+          </a:xfrm>
+          <a:prstGeom prst="rect">
+            <a:avLst/>
+          </a:prstGeom>
+        </p:spPr>
+      </p:pic>
+      <p:pic>
+        <p:nvPicPr>
+          <p:cNvPr id="6" name="Picture 5" descr="A person smiling for the camera&#10;&#10;Description automatically generated">
+            <a:extLst>
+              <a:ext uri="{FF2B5EF4-FFF2-40B4-BE49-F238E27FC236}">
+                <a16:creationId xmlns:a16="http://schemas.microsoft.com/office/drawing/2014/main" id="{C1FEE733-C1C7-4871-AF0A-55D36EDAD347}"/>
+              </a:ext>
+            </a:extLst>
+          </p:cNvPr>
+          <p:cNvPicPr>
+            <a:picLocks noChangeAspect="1"/>
+          </p:cNvPicPr>
+          <p:nvPr/>
+        </p:nvPicPr>
+        <p:blipFill>
+          <a:blip r:embed="rId8"/>
+          <a:stretch>
+            <a:fillRect/>
+          </a:stretch>
+        </p:blipFill>
+        <p:spPr>
+          <a:xfrm>
+            <a:off x="7262695" y="244136"/>
+            <a:ext cx="4758252" cy="4773168"/>
+          </a:xfrm>
+          <a:prstGeom prst="rect">
+            <a:avLst/>
+          </a:prstGeom>
+          <a:ln>
+            <a:noFill/>
+          </a:ln>
+          <a:effectLst>
+            <a:softEdge rad="112500"/>
+          </a:effectLst>
+        </p:spPr>
+      </p:pic>
+    </p:spTree>
+    <p:extLst>
+      <p:ext uri="{BB962C8B-B14F-4D97-AF65-F5344CB8AC3E}">
+        <p14:creationId xmlns:p14="http://schemas.microsoft.com/office/powerpoint/2010/main" val="2663063912"/>
+      </p:ext>
+    </p:extLst>
+  </p:cSld>
+  <p:clrMapOvr>
+    <a:masterClrMapping/>
+  </p:clrMapOvr>
+</p:sld>
+</file>
+
+<file path=ppt/slides/slide3.xml><?xml version="1.0" encoding="utf-8"?>
 <p:sld xmlns:a="http://schemas.openxmlformats.org/drawingml/2006/main" xmlns:r="http://schemas.openxmlformats.org/officeDocument/2006/relationships" xmlns:p="http://schemas.openxmlformats.org/presentationml/2006/main">
   <p:cSld>
     <p:spTree>
@@ -5995,7 +8097,7 @@
 </p:sld>
 </file>
 
-<file path=ppt/slides/slide3.xml><?xml version="1.0" encoding="utf-8"?>
+<file path=ppt/slides/slide4.xml><?xml version="1.0" encoding="utf-8"?>
 <p:sld xmlns:a="http://schemas.openxmlformats.org/drawingml/2006/main" xmlns:r="http://schemas.openxmlformats.org/officeDocument/2006/relationships" xmlns:p="http://schemas.openxmlformats.org/presentationml/2006/main">
   <p:cSld>
     <p:spTree>
@@ -6454,7 +8556,7 @@
 </p:sld>
 </file>
 
-<file path=ppt/slides/slide4.xml><?xml version="1.0" encoding="utf-8"?>
+<file path=ppt/slides/slide5.xml><?xml version="1.0" encoding="utf-8"?>
 <p:sld xmlns:a="http://schemas.openxmlformats.org/drawingml/2006/main" xmlns:r="http://schemas.openxmlformats.org/officeDocument/2006/relationships" xmlns:p="http://schemas.openxmlformats.org/presentationml/2006/main">
   <p:cSld>
     <p:spTree>
@@ -6556,7 +8658,7 @@
           <p:nvPr/>
         </p:nvPicPr>
         <p:blipFill>
-          <a:blip r:embed="rId2">
+          <a:blip r:embed="rId3">
             <a:extLst>
               <a:ext uri="{28A0092B-C50C-407E-A947-70E740481C1C}">
                 <a14:useLocalDpi xmlns:a14="http://schemas.microsoft.com/office/drawing/2010/main" val="0"/>
@@ -7044,7 +9146,599 @@
 </p:sld>
 </file>
 
-<file path=ppt/slides/slide5.xml><?xml version="1.0" encoding="utf-8"?>
+<file path=ppt/slides/slide6.xml><?xml version="1.0" encoding="utf-8"?>
+<p:sld xmlns:a="http://schemas.openxmlformats.org/drawingml/2006/main" xmlns:r="http://schemas.openxmlformats.org/officeDocument/2006/relationships" xmlns:p="http://schemas.openxmlformats.org/presentationml/2006/main">
+  <p:cSld>
+    <p:spTree>
+      <p:nvGrpSpPr>
+        <p:cNvPr id="1" name=""/>
+        <p:cNvGrpSpPr/>
+        <p:nvPr/>
+      </p:nvGrpSpPr>
+      <p:grpSpPr>
+        <a:xfrm>
+          <a:off x="0" y="0"/>
+          <a:ext cx="0" cy="0"/>
+          <a:chOff x="0" y="0"/>
+          <a:chExt cx="0" cy="0"/>
+        </a:xfrm>
+      </p:grpSpPr>
+      <p:sp>
+        <p:nvSpPr>
+          <p:cNvPr id="8" name="Rectangle: Rounded Corners 7">
+            <a:extLst>
+              <a:ext uri="{FF2B5EF4-FFF2-40B4-BE49-F238E27FC236}">
+                <a16:creationId xmlns:a16="http://schemas.microsoft.com/office/drawing/2014/main" id="{2E6FCA46-D396-42AA-ACDF-814DD7471DDE}"/>
+              </a:ext>
+            </a:extLst>
+          </p:cNvPr>
+          <p:cNvSpPr/>
+          <p:nvPr/>
+        </p:nvSpPr>
+        <p:spPr>
+          <a:xfrm>
+            <a:off x="1635470" y="2377440"/>
+            <a:ext cx="5384308" cy="2899954"/>
+          </a:xfrm>
+          <a:prstGeom prst="roundRect">
+            <a:avLst/>
+          </a:prstGeom>
+          <a:solidFill>
+            <a:schemeClr val="bg1">
+              <a:lumMod val="95000"/>
+            </a:schemeClr>
+          </a:solidFill>
+          <a:ln>
+            <a:noFill/>
+          </a:ln>
+        </p:spPr>
+        <p:style>
+          <a:lnRef idx="1">
+            <a:schemeClr val="accent4"/>
+          </a:lnRef>
+          <a:fillRef idx="3">
+            <a:schemeClr val="accent4"/>
+          </a:fillRef>
+          <a:effectRef idx="2">
+            <a:schemeClr val="accent4"/>
+          </a:effectRef>
+          <a:fontRef idx="minor">
+            <a:schemeClr val="lt1"/>
+          </a:fontRef>
+        </p:style>
+        <p:txBody>
+          <a:bodyPr rtlCol="0" anchor="ctr"/>
+          <a:lstStyle/>
+          <a:p>
+            <a:pPr algn="ctr"/>
+            <a:endParaRPr lang="en-US" dirty="0"/>
+          </a:p>
+        </p:txBody>
+      </p:sp>
+      <p:sp>
+        <p:nvSpPr>
+          <p:cNvPr id="2" name="Title 1">
+            <a:extLst>
+              <a:ext uri="{FF2B5EF4-FFF2-40B4-BE49-F238E27FC236}">
+                <a16:creationId xmlns:a16="http://schemas.microsoft.com/office/drawing/2014/main" id="{96A1C3DA-303C-4713-A8D7-B3E0BE934852}"/>
+              </a:ext>
+            </a:extLst>
+          </p:cNvPr>
+          <p:cNvSpPr>
+            <a:spLocks noGrp="1"/>
+          </p:cNvSpPr>
+          <p:nvPr>
+            <p:ph type="title"/>
+          </p:nvPr>
+        </p:nvSpPr>
+        <p:spPr/>
+        <p:txBody>
+          <a:bodyPr/>
+          <a:lstStyle/>
+          <a:p>
+            <a:r>
+              <a:rPr lang="en-US" dirty="0"/>
+              <a:t>Como </a:t>
+            </a:r>
+            <a:r>
+              <a:rPr lang="en-US" dirty="0" err="1"/>
+              <a:t>funciona</a:t>
+            </a:r>
+            <a:r>
+              <a:rPr lang="en-US" dirty="0"/>
+              <a:t>?</a:t>
+            </a:r>
+          </a:p>
+        </p:txBody>
+      </p:sp>
+      <p:sp>
+        <p:nvSpPr>
+          <p:cNvPr id="3" name="Rectangle: Rounded Corners 2">
+            <a:extLst>
+              <a:ext uri="{FF2B5EF4-FFF2-40B4-BE49-F238E27FC236}">
+                <a16:creationId xmlns:a16="http://schemas.microsoft.com/office/drawing/2014/main" id="{332723B7-5C3B-4F36-B9FA-BD9C8804A0C1}"/>
+              </a:ext>
+            </a:extLst>
+          </p:cNvPr>
+          <p:cNvSpPr/>
+          <p:nvPr/>
+        </p:nvSpPr>
+        <p:spPr>
+          <a:xfrm>
+            <a:off x="1214846" y="2377440"/>
+            <a:ext cx="2312125" cy="2899954"/>
+          </a:xfrm>
+          <a:prstGeom prst="roundRect">
+            <a:avLst/>
+          </a:prstGeom>
+        </p:spPr>
+        <p:style>
+          <a:lnRef idx="1">
+            <a:schemeClr val="accent4"/>
+          </a:lnRef>
+          <a:fillRef idx="3">
+            <a:schemeClr val="accent4"/>
+          </a:fillRef>
+          <a:effectRef idx="2">
+            <a:schemeClr val="accent4"/>
+          </a:effectRef>
+          <a:fontRef idx="minor">
+            <a:schemeClr val="lt1"/>
+          </a:fontRef>
+        </p:style>
+        <p:txBody>
+          <a:bodyPr rtlCol="0" anchor="ctr"/>
+          <a:lstStyle/>
+          <a:p>
+            <a:pPr algn="ctr"/>
+            <a:r>
+              <a:rPr lang="en-US" dirty="0"/>
+              <a:t>Application</a:t>
+            </a:r>
+          </a:p>
+        </p:txBody>
+      </p:sp>
+      <p:pic>
+        <p:nvPicPr>
+          <p:cNvPr id="5" name="Picture 4">
+            <a:extLst>
+              <a:ext uri="{FF2B5EF4-FFF2-40B4-BE49-F238E27FC236}">
+                <a16:creationId xmlns:a16="http://schemas.microsoft.com/office/drawing/2014/main" id="{5E1334BC-23A0-4F9C-8FE7-005F99F943B6}"/>
+              </a:ext>
+            </a:extLst>
+          </p:cNvPr>
+          <p:cNvPicPr>
+            <a:picLocks noChangeAspect="1"/>
+          </p:cNvPicPr>
+          <p:nvPr/>
+        </p:nvPicPr>
+        <p:blipFill>
+          <a:blip r:embed="rId2"/>
+          <a:stretch>
+            <a:fillRect/>
+          </a:stretch>
+        </p:blipFill>
+        <p:spPr>
+          <a:xfrm>
+            <a:off x="1574076" y="4801554"/>
+            <a:ext cx="796832" cy="796832"/>
+          </a:xfrm>
+          <a:prstGeom prst="rect">
+            <a:avLst/>
+          </a:prstGeom>
+          <a:effectLst>
+            <a:outerShdw blurRad="50800" dist="38100" dir="10800000" algn="r" rotWithShape="0">
+              <a:prstClr val="black">
+                <a:alpha val="40000"/>
+              </a:prstClr>
+            </a:outerShdw>
+          </a:effectLst>
+        </p:spPr>
+      </p:pic>
+      <p:pic>
+        <p:nvPicPr>
+          <p:cNvPr id="7" name="Picture 6">
+            <a:extLst>
+              <a:ext uri="{FF2B5EF4-FFF2-40B4-BE49-F238E27FC236}">
+                <a16:creationId xmlns:a16="http://schemas.microsoft.com/office/drawing/2014/main" id="{541C065D-075B-4039-B4A3-11C31826F790}"/>
+              </a:ext>
+            </a:extLst>
+          </p:cNvPr>
+          <p:cNvPicPr>
+            <a:picLocks noChangeAspect="1"/>
+          </p:cNvPicPr>
+          <p:nvPr/>
+        </p:nvPicPr>
+        <p:blipFill>
+          <a:blip r:embed="rId3"/>
+          <a:stretch>
+            <a:fillRect/>
+          </a:stretch>
+        </p:blipFill>
+        <p:spPr>
+          <a:xfrm>
+            <a:off x="2430010" y="4875340"/>
+            <a:ext cx="723046" cy="723046"/>
+          </a:xfrm>
+          <a:prstGeom prst="rect">
+            <a:avLst/>
+          </a:prstGeom>
+          <a:effectLst>
+            <a:outerShdw blurRad="50800" dist="38100" dir="8100000" algn="tr" rotWithShape="0">
+              <a:prstClr val="black">
+                <a:alpha val="40000"/>
+              </a:prstClr>
+            </a:outerShdw>
+          </a:effectLst>
+        </p:spPr>
+      </p:pic>
+      <p:pic>
+        <p:nvPicPr>
+          <p:cNvPr id="10" name="Picture 9" descr="A close up of a logo&#10;&#10;Description automatically generated">
+            <a:extLst>
+              <a:ext uri="{FF2B5EF4-FFF2-40B4-BE49-F238E27FC236}">
+                <a16:creationId xmlns:a16="http://schemas.microsoft.com/office/drawing/2014/main" id="{0EFC7BB3-41BA-428F-9170-23B8EFEC86CB}"/>
+              </a:ext>
+            </a:extLst>
+          </p:cNvPr>
+          <p:cNvPicPr>
+            <a:picLocks noChangeAspect="1"/>
+          </p:cNvPicPr>
+          <p:nvPr/>
+        </p:nvPicPr>
+        <p:blipFill>
+          <a:blip r:embed="rId4"/>
+          <a:stretch>
+            <a:fillRect/>
+          </a:stretch>
+        </p:blipFill>
+        <p:spPr>
+          <a:xfrm>
+            <a:off x="4476542" y="3376348"/>
+            <a:ext cx="796832" cy="796832"/>
+          </a:xfrm>
+          <a:prstGeom prst="rect">
+            <a:avLst/>
+          </a:prstGeom>
+        </p:spPr>
+      </p:pic>
+      <p:sp>
+        <p:nvSpPr>
+          <p:cNvPr id="11" name="TextBox 10">
+            <a:extLst>
+              <a:ext uri="{FF2B5EF4-FFF2-40B4-BE49-F238E27FC236}">
+                <a16:creationId xmlns:a16="http://schemas.microsoft.com/office/drawing/2014/main" id="{7242B17B-18AE-4BD6-94C6-3DB29F3D2ADB}"/>
+              </a:ext>
+            </a:extLst>
+          </p:cNvPr>
+          <p:cNvSpPr txBox="1"/>
+          <p:nvPr/>
+        </p:nvSpPr>
+        <p:spPr>
+          <a:xfrm>
+            <a:off x="4136404" y="4281122"/>
+            <a:ext cx="1477107" cy="369332"/>
+          </a:xfrm>
+          <a:prstGeom prst="rect">
+            <a:avLst/>
+          </a:prstGeom>
+          <a:noFill/>
+        </p:spPr>
+        <p:txBody>
+          <a:bodyPr wrap="square" rtlCol="0">
+            <a:spAutoFit/>
+          </a:bodyPr>
+          <a:lstStyle/>
+          <a:p>
+            <a:r>
+              <a:rPr lang="en-US" dirty="0"/>
+              <a:t>Decision point</a:t>
+            </a:r>
+          </a:p>
+        </p:txBody>
+      </p:sp>
+      <p:pic>
+        <p:nvPicPr>
+          <p:cNvPr id="12" name="Picture 2" descr="Image result for feature toggle">
+            <a:extLst>
+              <a:ext uri="{FF2B5EF4-FFF2-40B4-BE49-F238E27FC236}">
+                <a16:creationId xmlns:a16="http://schemas.microsoft.com/office/drawing/2014/main" id="{5C17A92B-9B81-4027-8E33-CAF085B00B12}"/>
+              </a:ext>
+            </a:extLst>
+          </p:cNvPr>
+          <p:cNvPicPr>
+            <a:picLocks noChangeAspect="1" noChangeArrowheads="1"/>
+          </p:cNvPicPr>
+          <p:nvPr/>
+        </p:nvPicPr>
+        <p:blipFill>
+          <a:blip r:embed="rId5">
+            <a:extLst>
+              <a:ext uri="{28A0092B-C50C-407E-A947-70E740481C1C}">
+                <a14:useLocalDpi xmlns:a14="http://schemas.microsoft.com/office/drawing/2010/main" val="0"/>
+              </a:ext>
+            </a:extLst>
+          </a:blip>
+          <a:srcRect/>
+          <a:stretch>
+            <a:fillRect/>
+          </a:stretch>
+        </p:blipFill>
+        <p:spPr bwMode="auto">
+          <a:xfrm>
+            <a:off x="5408022" y="2873888"/>
+            <a:ext cx="1477107" cy="830873"/>
+          </a:xfrm>
+          <a:prstGeom prst="rect">
+            <a:avLst/>
+          </a:prstGeom>
+          <a:noFill/>
+          <a:extLst>
+            <a:ext uri="{909E8E84-426E-40DD-AFC4-6F175D3DCCD1}">
+              <a14:hiddenFill xmlns:a14="http://schemas.microsoft.com/office/drawing/2010/main">
+                <a:solidFill>
+                  <a:srgbClr val="FFFFFF"/>
+                </a:solidFill>
+              </a14:hiddenFill>
+            </a:ext>
+          </a:extLst>
+        </p:spPr>
+      </p:pic>
+      <p:pic>
+        <p:nvPicPr>
+          <p:cNvPr id="14" name="Picture 13" descr="A picture containing iPod&#10;&#10;Description automatically generated">
+            <a:extLst>
+              <a:ext uri="{FF2B5EF4-FFF2-40B4-BE49-F238E27FC236}">
+                <a16:creationId xmlns:a16="http://schemas.microsoft.com/office/drawing/2014/main" id="{C4B38BFE-CC9B-48C7-8BB8-2647DC1F29CF}"/>
+              </a:ext>
+            </a:extLst>
+          </p:cNvPr>
+          <p:cNvPicPr>
+            <a:picLocks noChangeAspect="1"/>
+          </p:cNvPicPr>
+          <p:nvPr/>
+        </p:nvPicPr>
+        <p:blipFill>
+          <a:blip r:embed="rId6"/>
+          <a:stretch>
+            <a:fillRect/>
+          </a:stretch>
+        </p:blipFill>
+        <p:spPr>
+          <a:xfrm>
+            <a:off x="9584729" y="2706852"/>
+            <a:ext cx="1943602" cy="1943602"/>
+          </a:xfrm>
+          <a:prstGeom prst="rect">
+            <a:avLst/>
+          </a:prstGeom>
+          <a:effectLst>
+            <a:outerShdw blurRad="50800" dist="38100" dir="10800000" algn="r" rotWithShape="0">
+              <a:prstClr val="black">
+                <a:alpha val="40000"/>
+              </a:prstClr>
+            </a:outerShdw>
+          </a:effectLst>
+        </p:spPr>
+      </p:pic>
+      <p:sp>
+        <p:nvSpPr>
+          <p:cNvPr id="15" name="TextBox 14">
+            <a:extLst>
+              <a:ext uri="{FF2B5EF4-FFF2-40B4-BE49-F238E27FC236}">
+                <a16:creationId xmlns:a16="http://schemas.microsoft.com/office/drawing/2014/main" id="{1659037B-823A-4D44-9EA8-E2AA58885501}"/>
+              </a:ext>
+            </a:extLst>
+          </p:cNvPr>
+          <p:cNvSpPr txBox="1"/>
+          <p:nvPr/>
+        </p:nvSpPr>
+        <p:spPr>
+          <a:xfrm>
+            <a:off x="9461862" y="4690674"/>
+            <a:ext cx="2312124" cy="369332"/>
+          </a:xfrm>
+          <a:prstGeom prst="rect">
+            <a:avLst/>
+          </a:prstGeom>
+          <a:noFill/>
+        </p:spPr>
+        <p:txBody>
+          <a:bodyPr wrap="square" rtlCol="0">
+            <a:spAutoFit/>
+          </a:bodyPr>
+          <a:lstStyle/>
+          <a:p>
+            <a:r>
+              <a:rPr lang="en-US" dirty="0"/>
+              <a:t>Toggle Management</a:t>
+            </a:r>
+          </a:p>
+        </p:txBody>
+      </p:sp>
+      <p:pic>
+        <p:nvPicPr>
+          <p:cNvPr id="17" name="Picture 16" descr="A close up of a logo&#10;&#10;Description automatically generated">
+            <a:extLst>
+              <a:ext uri="{FF2B5EF4-FFF2-40B4-BE49-F238E27FC236}">
+                <a16:creationId xmlns:a16="http://schemas.microsoft.com/office/drawing/2014/main" id="{F9DA793E-3C6D-4ED2-9701-E2523D276B4C}"/>
+              </a:ext>
+            </a:extLst>
+          </p:cNvPr>
+          <p:cNvPicPr>
+            <a:picLocks noChangeAspect="1"/>
+          </p:cNvPicPr>
+          <p:nvPr/>
+        </p:nvPicPr>
+        <p:blipFill>
+          <a:blip r:embed="rId7"/>
+          <a:stretch>
+            <a:fillRect/>
+          </a:stretch>
+        </p:blipFill>
+        <p:spPr>
+          <a:xfrm>
+            <a:off x="9049355" y="1569500"/>
+            <a:ext cx="723047" cy="723047"/>
+          </a:xfrm>
+          <a:prstGeom prst="rect">
+            <a:avLst/>
+          </a:prstGeom>
+        </p:spPr>
+      </p:pic>
+      <p:pic>
+        <p:nvPicPr>
+          <p:cNvPr id="19" name="Picture 18" descr="A picture containing vector graphics&#10;&#10;Description automatically generated">
+            <a:extLst>
+              <a:ext uri="{FF2B5EF4-FFF2-40B4-BE49-F238E27FC236}">
+                <a16:creationId xmlns:a16="http://schemas.microsoft.com/office/drawing/2014/main" id="{D5B0CDA0-378D-42B8-BCC8-77B78AA7FEEC}"/>
+              </a:ext>
+            </a:extLst>
+          </p:cNvPr>
+          <p:cNvPicPr>
+            <a:picLocks noChangeAspect="1"/>
+          </p:cNvPicPr>
+          <p:nvPr/>
+        </p:nvPicPr>
+        <p:blipFill>
+          <a:blip r:embed="rId8"/>
+          <a:stretch>
+            <a:fillRect/>
+          </a:stretch>
+        </p:blipFill>
+        <p:spPr>
+          <a:xfrm>
+            <a:off x="10057607" y="1569500"/>
+            <a:ext cx="807940" cy="807940"/>
+          </a:xfrm>
+          <a:prstGeom prst="rect">
+            <a:avLst/>
+          </a:prstGeom>
+        </p:spPr>
+      </p:pic>
+      <p:pic>
+        <p:nvPicPr>
+          <p:cNvPr id="21" name="Picture 20">
+            <a:extLst>
+              <a:ext uri="{FF2B5EF4-FFF2-40B4-BE49-F238E27FC236}">
+                <a16:creationId xmlns:a16="http://schemas.microsoft.com/office/drawing/2014/main" id="{E67B9C4C-505E-41AE-85C6-23F9A7A1D5FC}"/>
+              </a:ext>
+            </a:extLst>
+          </p:cNvPr>
+          <p:cNvPicPr>
+            <a:picLocks noChangeAspect="1"/>
+          </p:cNvPicPr>
+          <p:nvPr/>
+        </p:nvPicPr>
+        <p:blipFill>
+          <a:blip r:embed="rId9"/>
+          <a:stretch>
+            <a:fillRect/>
+          </a:stretch>
+        </p:blipFill>
+        <p:spPr>
+          <a:xfrm>
+            <a:off x="11029405" y="1557350"/>
+            <a:ext cx="820090" cy="820090"/>
+          </a:xfrm>
+          <a:prstGeom prst="rect">
+            <a:avLst/>
+          </a:prstGeom>
+        </p:spPr>
+      </p:pic>
+      <p:sp>
+        <p:nvSpPr>
+          <p:cNvPr id="22" name="Arrow: Striped Right 21">
+            <a:extLst>
+              <a:ext uri="{FF2B5EF4-FFF2-40B4-BE49-F238E27FC236}">
+                <a16:creationId xmlns:a16="http://schemas.microsoft.com/office/drawing/2014/main" id="{3179826D-76B1-489F-8EEB-5423B3345513}"/>
+              </a:ext>
+            </a:extLst>
+          </p:cNvPr>
+          <p:cNvSpPr/>
+          <p:nvPr/>
+        </p:nvSpPr>
+        <p:spPr>
+          <a:xfrm>
+            <a:off x="7327008" y="3289324"/>
+            <a:ext cx="1943602" cy="1099796"/>
+          </a:xfrm>
+          <a:prstGeom prst="stripedRightArrow">
+            <a:avLst/>
+          </a:prstGeom>
+        </p:spPr>
+        <p:style>
+          <a:lnRef idx="0">
+            <a:schemeClr val="accent1"/>
+          </a:lnRef>
+          <a:fillRef idx="3">
+            <a:schemeClr val="accent1"/>
+          </a:fillRef>
+          <a:effectRef idx="3">
+            <a:schemeClr val="accent1"/>
+          </a:effectRef>
+          <a:fontRef idx="minor">
+            <a:schemeClr val="lt1"/>
+          </a:fontRef>
+        </p:style>
+        <p:txBody>
+          <a:bodyPr rtlCol="0" anchor="ctr"/>
+          <a:lstStyle/>
+          <a:p>
+            <a:pPr algn="ctr"/>
+            <a:endParaRPr lang="en-US"/>
+          </a:p>
+        </p:txBody>
+      </p:sp>
+      <p:sp>
+        <p:nvSpPr>
+          <p:cNvPr id="23" name="TextBox 22">
+            <a:extLst>
+              <a:ext uri="{FF2B5EF4-FFF2-40B4-BE49-F238E27FC236}">
+                <a16:creationId xmlns:a16="http://schemas.microsoft.com/office/drawing/2014/main" id="{44593CAB-6E16-4058-BEF2-8C393D2C889D}"/>
+              </a:ext>
+            </a:extLst>
+          </p:cNvPr>
+          <p:cNvSpPr txBox="1"/>
+          <p:nvPr/>
+        </p:nvSpPr>
+        <p:spPr>
+          <a:xfrm>
+            <a:off x="7893189" y="3642751"/>
+            <a:ext cx="534573" cy="369332"/>
+          </a:xfrm>
+          <a:prstGeom prst="rect">
+            <a:avLst/>
+          </a:prstGeom>
+          <a:noFill/>
+        </p:spPr>
+        <p:txBody>
+          <a:bodyPr wrap="square" rtlCol="0">
+            <a:spAutoFit/>
+          </a:bodyPr>
+          <a:lstStyle/>
+          <a:p>
+            <a:r>
+              <a:rPr lang="en-US" dirty="0"/>
+              <a:t>http</a:t>
+            </a:r>
+          </a:p>
+        </p:txBody>
+      </p:sp>
+    </p:spTree>
+    <p:extLst>
+      <p:ext uri="{BB962C8B-B14F-4D97-AF65-F5344CB8AC3E}">
+        <p14:creationId xmlns:p14="http://schemas.microsoft.com/office/powerpoint/2010/main" val="3869140817"/>
+      </p:ext>
+    </p:extLst>
+  </p:cSld>
+  <p:clrMapOvr>
+    <a:masterClrMapping/>
+  </p:clrMapOvr>
+</p:sld>
+</file>
+
+<file path=ppt/slides/slide7.xml><?xml version="1.0" encoding="utf-8"?>
 <p:sld xmlns:a="http://schemas.openxmlformats.org/drawingml/2006/main" xmlns:r="http://schemas.openxmlformats.org/officeDocument/2006/relationships" xmlns:p="http://schemas.openxmlformats.org/presentationml/2006/main">
   <p:cSld>
     <p:spTree>
@@ -7393,7 +10087,7 @@
 </p:sld>
 </file>
 
-<file path=ppt/slides/slide6.xml><?xml version="1.0" encoding="utf-8"?>
+<file path=ppt/slides/slide8.xml><?xml version="1.0" encoding="utf-8"?>
 <p:sld xmlns:a="http://schemas.openxmlformats.org/drawingml/2006/main" xmlns:r="http://schemas.openxmlformats.org/officeDocument/2006/relationships" xmlns:p="http://schemas.openxmlformats.org/presentationml/2006/main">
   <p:cSld>
     <p:spTree>
@@ -7869,924 +10563,6 @@
 </p:sld>
 </file>
 
-<file path=ppt/slides/slide7.xml><?xml version="1.0" encoding="utf-8"?>
-<p:sld xmlns:a="http://schemas.openxmlformats.org/drawingml/2006/main" xmlns:r="http://schemas.openxmlformats.org/officeDocument/2006/relationships" xmlns:p="http://schemas.openxmlformats.org/presentationml/2006/main">
-  <p:cSld>
-    <p:spTree>
-      <p:nvGrpSpPr>
-        <p:cNvPr id="1" name=""/>
-        <p:cNvGrpSpPr/>
-        <p:nvPr/>
-      </p:nvGrpSpPr>
-      <p:grpSpPr>
-        <a:xfrm>
-          <a:off x="0" y="0"/>
-          <a:ext cx="0" cy="0"/>
-          <a:chOff x="0" y="0"/>
-          <a:chExt cx="0" cy="0"/>
-        </a:xfrm>
-      </p:grpSpPr>
-      <p:sp>
-        <p:nvSpPr>
-          <p:cNvPr id="3" name="Título 2"/>
-          <p:cNvSpPr>
-            <a:spLocks noGrp="1"/>
-          </p:cNvSpPr>
-          <p:nvPr>
-            <p:ph type="title"/>
-          </p:nvPr>
-        </p:nvSpPr>
-        <p:spPr/>
-        <p:txBody>
-          <a:bodyPr>
-            <a:normAutofit/>
-          </a:bodyPr>
-          <a:lstStyle/>
-          <a:p>
-            <a:r>
-              <a:rPr lang="pt-BR" sz="5400" spc="-300" dirty="0">
-                <a:solidFill>
-                  <a:schemeClr val="tx1"/>
-                </a:solidFill>
-              </a:rPr>
-              <a:t>Vantagens e desvantagens</a:t>
-            </a:r>
-          </a:p>
-        </p:txBody>
-      </p:sp>
-      <p:sp>
-        <p:nvSpPr>
-          <p:cNvPr id="4" name="CaixaDeTexto 3">
-            <a:extLst>
-              <a:ext uri="{FF2B5EF4-FFF2-40B4-BE49-F238E27FC236}">
-                <a16:creationId xmlns:a16="http://schemas.microsoft.com/office/drawing/2014/main" id="{057F1F55-D955-43F8-933C-19B7AF554E3E}"/>
-              </a:ext>
-            </a:extLst>
-          </p:cNvPr>
-          <p:cNvSpPr txBox="1"/>
-          <p:nvPr/>
-        </p:nvSpPr>
-        <p:spPr>
-          <a:xfrm>
-            <a:off x="9596486" y="6380946"/>
-            <a:ext cx="2488676" cy="477054"/>
-          </a:xfrm>
-          <a:prstGeom prst="rect">
-            <a:avLst/>
-          </a:prstGeom>
-          <a:noFill/>
-        </p:spPr>
-        <p:txBody>
-          <a:bodyPr wrap="square" rtlCol="0">
-            <a:spAutoFit/>
-          </a:bodyPr>
-          <a:lstStyle/>
-          <a:p>
-            <a:r>
-              <a:rPr lang="pt-BR" sz="2500" b="1" dirty="0">
-                <a:solidFill>
-                  <a:srgbClr val="67217A"/>
-                </a:solidFill>
-                <a:latin typeface="Verdana" panose="020B0604030504040204" pitchFamily="34" charset="0"/>
-                <a:ea typeface="Verdana" panose="020B0604030504040204" pitchFamily="34" charset="0"/>
-                <a:cs typeface="Verdana" panose="020B0604030504040204" pitchFamily="34" charset="0"/>
-              </a:rPr>
-              <a:t>#VSSUMMIT</a:t>
-            </a:r>
-          </a:p>
-        </p:txBody>
-      </p:sp>
-      <p:cxnSp>
-        <p:nvCxnSpPr>
-          <p:cNvPr id="7" name="Straight Connector 6">
-            <a:extLst>
-              <a:ext uri="{FF2B5EF4-FFF2-40B4-BE49-F238E27FC236}">
-                <a16:creationId xmlns:a16="http://schemas.microsoft.com/office/drawing/2014/main" id="{A8E051CC-4DB5-4D2E-8080-CB4300EFCCB1}"/>
-              </a:ext>
-            </a:extLst>
-          </p:cNvPr>
-          <p:cNvCxnSpPr/>
-          <p:nvPr/>
-        </p:nvCxnSpPr>
-        <p:spPr>
-          <a:xfrm>
-            <a:off x="5878286" y="2573383"/>
-            <a:ext cx="0" cy="3971108"/>
-          </a:xfrm>
-          <a:prstGeom prst="line">
-            <a:avLst/>
-          </a:prstGeom>
-          <a:ln w="28575">
-            <a:solidFill>
-              <a:schemeClr val="bg1">
-                <a:lumMod val="50000"/>
-              </a:schemeClr>
-            </a:solidFill>
-          </a:ln>
-        </p:spPr>
-        <p:style>
-          <a:lnRef idx="1">
-            <a:schemeClr val="accent1"/>
-          </a:lnRef>
-          <a:fillRef idx="0">
-            <a:schemeClr val="accent1"/>
-          </a:fillRef>
-          <a:effectRef idx="0">
-            <a:schemeClr val="accent1"/>
-          </a:effectRef>
-          <a:fontRef idx="minor">
-            <a:schemeClr val="tx1"/>
-          </a:fontRef>
-        </p:style>
-      </p:cxnSp>
-      <p:pic>
-        <p:nvPicPr>
-          <p:cNvPr id="9" name="Picture 8" descr="A close up of a logo&#10;&#10;Description automatically generated">
-            <a:extLst>
-              <a:ext uri="{FF2B5EF4-FFF2-40B4-BE49-F238E27FC236}">
-                <a16:creationId xmlns:a16="http://schemas.microsoft.com/office/drawing/2014/main" id="{5E63E8CD-33D8-439B-9ED3-C5906008EA04}"/>
-              </a:ext>
-            </a:extLst>
-          </p:cNvPr>
-          <p:cNvPicPr>
-            <a:picLocks noChangeAspect="1"/>
-          </p:cNvPicPr>
-          <p:nvPr/>
-        </p:nvPicPr>
-        <p:blipFill>
-          <a:blip r:embed="rId2"/>
-          <a:stretch>
-            <a:fillRect/>
-          </a:stretch>
-        </p:blipFill>
-        <p:spPr>
-          <a:xfrm>
-            <a:off x="6875237" y="2573383"/>
-            <a:ext cx="862149" cy="862149"/>
-          </a:xfrm>
-          <a:prstGeom prst="rect">
-            <a:avLst/>
-          </a:prstGeom>
-        </p:spPr>
-      </p:pic>
-      <p:pic>
-        <p:nvPicPr>
-          <p:cNvPr id="11" name="Picture 10" descr="A close up of a sign&#10;&#10;Description automatically generated">
-            <a:extLst>
-              <a:ext uri="{FF2B5EF4-FFF2-40B4-BE49-F238E27FC236}">
-                <a16:creationId xmlns:a16="http://schemas.microsoft.com/office/drawing/2014/main" id="{4C11911E-2200-4FA2-B5F3-C17E972E2188}"/>
-              </a:ext>
-            </a:extLst>
-          </p:cNvPr>
-          <p:cNvPicPr>
-            <a:picLocks noChangeAspect="1"/>
-          </p:cNvPicPr>
-          <p:nvPr/>
-        </p:nvPicPr>
-        <p:blipFill>
-          <a:blip r:embed="rId3"/>
-          <a:stretch>
-            <a:fillRect/>
-          </a:stretch>
-        </p:blipFill>
-        <p:spPr>
-          <a:xfrm>
-            <a:off x="1024128" y="2573383"/>
-            <a:ext cx="862149" cy="862149"/>
-          </a:xfrm>
-          <a:prstGeom prst="rect">
-            <a:avLst/>
-          </a:prstGeom>
-        </p:spPr>
-      </p:pic>
-      <p:pic>
-        <p:nvPicPr>
-          <p:cNvPr id="13" name="Picture 12">
-            <a:extLst>
-              <a:ext uri="{FF2B5EF4-FFF2-40B4-BE49-F238E27FC236}">
-                <a16:creationId xmlns:a16="http://schemas.microsoft.com/office/drawing/2014/main" id="{68ADA295-9C2E-42D2-8B5F-4B9BBEC5EFF0}"/>
-              </a:ext>
-            </a:extLst>
-          </p:cNvPr>
-          <p:cNvPicPr>
-            <a:picLocks noChangeAspect="1"/>
-          </p:cNvPicPr>
-          <p:nvPr/>
-        </p:nvPicPr>
-        <p:blipFill>
-          <a:blip r:embed="rId4"/>
-          <a:stretch>
-            <a:fillRect/>
-          </a:stretch>
-        </p:blipFill>
-        <p:spPr>
-          <a:xfrm>
-            <a:off x="4025719" y="2573383"/>
-            <a:ext cx="855617" cy="855617"/>
-          </a:xfrm>
-          <a:prstGeom prst="rect">
-            <a:avLst/>
-          </a:prstGeom>
-        </p:spPr>
-      </p:pic>
-      <p:pic>
-        <p:nvPicPr>
-          <p:cNvPr id="15" name="Picture 14" descr="A close up of a logo&#10;&#10;Description automatically generated">
-            <a:extLst>
-              <a:ext uri="{FF2B5EF4-FFF2-40B4-BE49-F238E27FC236}">
-                <a16:creationId xmlns:a16="http://schemas.microsoft.com/office/drawing/2014/main" id="{826AF9DF-90A7-421C-9491-DA4A78AC1854}"/>
-              </a:ext>
-            </a:extLst>
-          </p:cNvPr>
-          <p:cNvPicPr>
-            <a:picLocks noChangeAspect="1"/>
-          </p:cNvPicPr>
-          <p:nvPr/>
-        </p:nvPicPr>
-        <p:blipFill>
-          <a:blip r:embed="rId5">
-            <a:duotone>
-              <a:schemeClr val="accent3">
-                <a:shade val="45000"/>
-                <a:satMod val="135000"/>
-              </a:schemeClr>
-              <a:prstClr val="white"/>
-            </a:duotone>
-          </a:blip>
-          <a:stretch>
-            <a:fillRect/>
-          </a:stretch>
-        </p:blipFill>
-        <p:spPr>
-          <a:xfrm>
-            <a:off x="1030660" y="4558937"/>
-            <a:ext cx="855617" cy="855617"/>
-          </a:xfrm>
-          <a:prstGeom prst="rect">
-            <a:avLst/>
-          </a:prstGeom>
-        </p:spPr>
-      </p:pic>
-      <p:pic>
-        <p:nvPicPr>
-          <p:cNvPr id="17" name="Picture 16">
-            <a:extLst>
-              <a:ext uri="{FF2B5EF4-FFF2-40B4-BE49-F238E27FC236}">
-                <a16:creationId xmlns:a16="http://schemas.microsoft.com/office/drawing/2014/main" id="{90023631-50DD-4A6A-87F8-9CB7286F8197}"/>
-              </a:ext>
-            </a:extLst>
-          </p:cNvPr>
-          <p:cNvPicPr>
-            <a:picLocks noChangeAspect="1"/>
-          </p:cNvPicPr>
-          <p:nvPr/>
-        </p:nvPicPr>
-        <p:blipFill>
-          <a:blip r:embed="rId6"/>
-          <a:stretch>
-            <a:fillRect/>
-          </a:stretch>
-        </p:blipFill>
-        <p:spPr>
-          <a:xfrm>
-            <a:off x="4025719" y="4552404"/>
-            <a:ext cx="862150" cy="862150"/>
-          </a:xfrm>
-          <a:prstGeom prst="rect">
-            <a:avLst/>
-          </a:prstGeom>
-        </p:spPr>
-      </p:pic>
-      <p:pic>
-        <p:nvPicPr>
-          <p:cNvPr id="19" name="Picture 18">
-            <a:extLst>
-              <a:ext uri="{FF2B5EF4-FFF2-40B4-BE49-F238E27FC236}">
-                <a16:creationId xmlns:a16="http://schemas.microsoft.com/office/drawing/2014/main" id="{C8C5A583-A2BA-4273-B6EA-A13D39405347}"/>
-              </a:ext>
-            </a:extLst>
-          </p:cNvPr>
-          <p:cNvPicPr>
-            <a:picLocks noChangeAspect="1"/>
-          </p:cNvPicPr>
-          <p:nvPr/>
-        </p:nvPicPr>
-        <p:blipFill>
-          <a:blip r:embed="rId7"/>
-          <a:stretch>
-            <a:fillRect/>
-          </a:stretch>
-        </p:blipFill>
-        <p:spPr>
-          <a:xfrm>
-            <a:off x="9870296" y="2566850"/>
-            <a:ext cx="862150" cy="862150"/>
-          </a:xfrm>
-          <a:prstGeom prst="rect">
-            <a:avLst/>
-          </a:prstGeom>
-        </p:spPr>
-      </p:pic>
-      <p:pic>
-        <p:nvPicPr>
-          <p:cNvPr id="21" name="Picture 20">
-            <a:extLst>
-              <a:ext uri="{FF2B5EF4-FFF2-40B4-BE49-F238E27FC236}">
-                <a16:creationId xmlns:a16="http://schemas.microsoft.com/office/drawing/2014/main" id="{2FC4FECE-0C0C-44B1-A276-C6A58A117C48}"/>
-              </a:ext>
-            </a:extLst>
-          </p:cNvPr>
-          <p:cNvPicPr>
-            <a:picLocks noChangeAspect="1"/>
-          </p:cNvPicPr>
-          <p:nvPr/>
-        </p:nvPicPr>
-        <p:blipFill>
-          <a:blip r:embed="rId8"/>
-          <a:stretch>
-            <a:fillRect/>
-          </a:stretch>
-        </p:blipFill>
-        <p:spPr>
-          <a:xfrm>
-            <a:off x="2589057" y="3581834"/>
-            <a:ext cx="862150" cy="862150"/>
-          </a:xfrm>
-          <a:prstGeom prst="rect">
-            <a:avLst/>
-          </a:prstGeom>
-        </p:spPr>
-      </p:pic>
-      <p:pic>
-        <p:nvPicPr>
-          <p:cNvPr id="23" name="Picture 22" descr="A picture containing vector graphics&#10;&#10;Description automatically generated">
-            <a:extLst>
-              <a:ext uri="{FF2B5EF4-FFF2-40B4-BE49-F238E27FC236}">
-                <a16:creationId xmlns:a16="http://schemas.microsoft.com/office/drawing/2014/main" id="{6E341A6A-14F3-4D76-92B8-FBC487E655EF}"/>
-              </a:ext>
-            </a:extLst>
-          </p:cNvPr>
-          <p:cNvPicPr>
-            <a:picLocks noChangeAspect="1"/>
-          </p:cNvPicPr>
-          <p:nvPr/>
-        </p:nvPicPr>
-        <p:blipFill>
-          <a:blip r:embed="rId9"/>
-          <a:stretch>
-            <a:fillRect/>
-          </a:stretch>
-        </p:blipFill>
-        <p:spPr>
-          <a:xfrm>
-            <a:off x="8546590" y="4558937"/>
-            <a:ext cx="862151" cy="862151"/>
-          </a:xfrm>
-          <a:prstGeom prst="rect">
-            <a:avLst/>
-          </a:prstGeom>
-        </p:spPr>
-      </p:pic>
-      <p:sp>
-        <p:nvSpPr>
-          <p:cNvPr id="24" name="TextBox 23">
-            <a:extLst>
-              <a:ext uri="{FF2B5EF4-FFF2-40B4-BE49-F238E27FC236}">
-                <a16:creationId xmlns:a16="http://schemas.microsoft.com/office/drawing/2014/main" id="{E9C4770E-3930-4100-8769-695CD529C248}"/>
-              </a:ext>
-            </a:extLst>
-          </p:cNvPr>
-          <p:cNvSpPr txBox="1"/>
-          <p:nvPr/>
-        </p:nvSpPr>
-        <p:spPr>
-          <a:xfrm>
-            <a:off x="3919384" y="3435532"/>
-            <a:ext cx="1196555" cy="646331"/>
-          </a:xfrm>
-          <a:prstGeom prst="rect">
-            <a:avLst/>
-          </a:prstGeom>
-          <a:noFill/>
-        </p:spPr>
-        <p:txBody>
-          <a:bodyPr wrap="square" rtlCol="0">
-            <a:spAutoFit/>
-          </a:bodyPr>
-          <a:lstStyle/>
-          <a:p>
-            <a:r>
-              <a:rPr lang="en-US" dirty="0"/>
-              <a:t>Testes A/B</a:t>
-            </a:r>
-          </a:p>
-          <a:p>
-            <a:pPr marL="285750" indent="-285750">
-              <a:buFont typeface="Arial" panose="020B0604020202020204" pitchFamily="34" charset="0"/>
-              <a:buChar char="•"/>
-            </a:pPr>
-            <a:endParaRPr lang="en-US" dirty="0"/>
-          </a:p>
-        </p:txBody>
-      </p:sp>
-      <p:sp>
-        <p:nvSpPr>
-          <p:cNvPr id="25" name="TextBox 24">
-            <a:extLst>
-              <a:ext uri="{FF2B5EF4-FFF2-40B4-BE49-F238E27FC236}">
-                <a16:creationId xmlns:a16="http://schemas.microsoft.com/office/drawing/2014/main" id="{57DD96C5-9E55-46D9-B297-810900388C49}"/>
-              </a:ext>
-            </a:extLst>
-          </p:cNvPr>
-          <p:cNvSpPr txBox="1"/>
-          <p:nvPr/>
-        </p:nvSpPr>
-        <p:spPr>
-          <a:xfrm>
-            <a:off x="3919383" y="5435174"/>
-            <a:ext cx="1196555" cy="646331"/>
-          </a:xfrm>
-          <a:prstGeom prst="rect">
-            <a:avLst/>
-          </a:prstGeom>
-          <a:noFill/>
-        </p:spPr>
-        <p:txBody>
-          <a:bodyPr wrap="square" rtlCol="0">
-            <a:spAutoFit/>
-          </a:bodyPr>
-          <a:lstStyle/>
-          <a:p>
-            <a:r>
-              <a:rPr lang="en-US" dirty="0" err="1"/>
-              <a:t>Estratégico</a:t>
-            </a:r>
-            <a:endParaRPr lang="en-US" dirty="0"/>
-          </a:p>
-          <a:p>
-            <a:pPr marL="285750" indent="-285750">
-              <a:buFont typeface="Arial" panose="020B0604020202020204" pitchFamily="34" charset="0"/>
-              <a:buChar char="•"/>
-            </a:pPr>
-            <a:endParaRPr lang="en-US" dirty="0"/>
-          </a:p>
-        </p:txBody>
-      </p:sp>
-      <p:sp>
-        <p:nvSpPr>
-          <p:cNvPr id="26" name="TextBox 25">
-            <a:extLst>
-              <a:ext uri="{FF2B5EF4-FFF2-40B4-BE49-F238E27FC236}">
-                <a16:creationId xmlns:a16="http://schemas.microsoft.com/office/drawing/2014/main" id="{D038EF2C-5922-4E53-B17C-BDB9C077167A}"/>
-              </a:ext>
-            </a:extLst>
-          </p:cNvPr>
-          <p:cNvSpPr txBox="1"/>
-          <p:nvPr/>
-        </p:nvSpPr>
-        <p:spPr>
-          <a:xfrm>
-            <a:off x="738574" y="5435176"/>
-            <a:ext cx="1433255" cy="646331"/>
-          </a:xfrm>
-          <a:prstGeom prst="rect">
-            <a:avLst/>
-          </a:prstGeom>
-          <a:noFill/>
-        </p:spPr>
-        <p:txBody>
-          <a:bodyPr wrap="square" rtlCol="0">
-            <a:spAutoFit/>
-          </a:bodyPr>
-          <a:lstStyle/>
-          <a:p>
-            <a:r>
-              <a:rPr lang="en-US" dirty="0"/>
-              <a:t>Trunk based</a:t>
-            </a:r>
-          </a:p>
-          <a:p>
-            <a:pPr marL="285750" indent="-285750">
-              <a:buFont typeface="Arial" panose="020B0604020202020204" pitchFamily="34" charset="0"/>
-              <a:buChar char="•"/>
-            </a:pPr>
-            <a:endParaRPr lang="en-US" dirty="0"/>
-          </a:p>
-        </p:txBody>
-      </p:sp>
-      <p:sp>
-        <p:nvSpPr>
-          <p:cNvPr id="27" name="TextBox 26">
-            <a:extLst>
-              <a:ext uri="{FF2B5EF4-FFF2-40B4-BE49-F238E27FC236}">
-                <a16:creationId xmlns:a16="http://schemas.microsoft.com/office/drawing/2014/main" id="{F84D2E36-143A-4C44-9078-0EF4CA5392F0}"/>
-              </a:ext>
-            </a:extLst>
-          </p:cNvPr>
-          <p:cNvSpPr txBox="1"/>
-          <p:nvPr/>
-        </p:nvSpPr>
-        <p:spPr>
-          <a:xfrm>
-            <a:off x="832498" y="3366578"/>
-            <a:ext cx="1433254" cy="646331"/>
-          </a:xfrm>
-          <a:prstGeom prst="rect">
-            <a:avLst/>
-          </a:prstGeom>
-          <a:noFill/>
-        </p:spPr>
-        <p:txBody>
-          <a:bodyPr wrap="square" rtlCol="0">
-            <a:spAutoFit/>
-          </a:bodyPr>
-          <a:lstStyle/>
-          <a:p>
-            <a:r>
-              <a:rPr lang="en-US" dirty="0" err="1"/>
-              <a:t>Ação</a:t>
-            </a:r>
-            <a:r>
-              <a:rPr lang="en-US" dirty="0"/>
-              <a:t> </a:t>
-            </a:r>
-            <a:r>
-              <a:rPr lang="en-US" dirty="0" err="1"/>
-              <a:t>rápida</a:t>
-            </a:r>
-            <a:endParaRPr lang="en-US" dirty="0"/>
-          </a:p>
-          <a:p>
-            <a:pPr marL="285750" indent="-285750">
-              <a:buFont typeface="Arial" panose="020B0604020202020204" pitchFamily="34" charset="0"/>
-              <a:buChar char="•"/>
-            </a:pPr>
-            <a:endParaRPr lang="en-US" dirty="0"/>
-          </a:p>
-        </p:txBody>
-      </p:sp>
-      <p:sp>
-        <p:nvSpPr>
-          <p:cNvPr id="28" name="TextBox 27">
-            <a:extLst>
-              <a:ext uri="{FF2B5EF4-FFF2-40B4-BE49-F238E27FC236}">
-                <a16:creationId xmlns:a16="http://schemas.microsoft.com/office/drawing/2014/main" id="{6FA1F956-DCAF-4E41-9F42-F6BAB3E59B7E}"/>
-              </a:ext>
-            </a:extLst>
-          </p:cNvPr>
-          <p:cNvSpPr txBox="1"/>
-          <p:nvPr/>
-        </p:nvSpPr>
-        <p:spPr>
-          <a:xfrm>
-            <a:off x="2343803" y="4450003"/>
-            <a:ext cx="1352657" cy="646331"/>
-          </a:xfrm>
-          <a:prstGeom prst="rect">
-            <a:avLst/>
-          </a:prstGeom>
-          <a:noFill/>
-        </p:spPr>
-        <p:txBody>
-          <a:bodyPr wrap="square" rtlCol="0">
-            <a:spAutoFit/>
-          </a:bodyPr>
-          <a:lstStyle/>
-          <a:p>
-            <a:r>
-              <a:rPr lang="en-US" dirty="0"/>
-              <a:t>QUALIDADE</a:t>
-            </a:r>
-          </a:p>
-          <a:p>
-            <a:pPr marL="285750" indent="-285750">
-              <a:buFont typeface="Arial" panose="020B0604020202020204" pitchFamily="34" charset="0"/>
-              <a:buChar char="•"/>
-            </a:pPr>
-            <a:endParaRPr lang="en-US" dirty="0"/>
-          </a:p>
-        </p:txBody>
-      </p:sp>
-      <p:sp>
-        <p:nvSpPr>
-          <p:cNvPr id="29" name="TextBox 28">
-            <a:extLst>
-              <a:ext uri="{FF2B5EF4-FFF2-40B4-BE49-F238E27FC236}">
-                <a16:creationId xmlns:a16="http://schemas.microsoft.com/office/drawing/2014/main" id="{D3EE2678-DD2A-4C8C-8674-0C955AEAB4BB}"/>
-              </a:ext>
-            </a:extLst>
-          </p:cNvPr>
-          <p:cNvSpPr txBox="1"/>
-          <p:nvPr/>
-        </p:nvSpPr>
-        <p:spPr>
-          <a:xfrm>
-            <a:off x="6548508" y="3581834"/>
-            <a:ext cx="1515605" cy="646331"/>
-          </a:xfrm>
-          <a:prstGeom prst="rect">
-            <a:avLst/>
-          </a:prstGeom>
-          <a:noFill/>
-        </p:spPr>
-        <p:txBody>
-          <a:bodyPr wrap="square" rtlCol="0">
-            <a:spAutoFit/>
-          </a:bodyPr>
-          <a:lstStyle/>
-          <a:p>
-            <a:r>
-              <a:rPr lang="en-US" dirty="0" err="1"/>
-              <a:t>Débito</a:t>
-            </a:r>
-            <a:r>
-              <a:rPr lang="en-US" dirty="0"/>
-              <a:t> </a:t>
-            </a:r>
-            <a:r>
-              <a:rPr lang="en-US" dirty="0" err="1"/>
-              <a:t>técnico</a:t>
-            </a:r>
-            <a:endParaRPr lang="en-US" dirty="0"/>
-          </a:p>
-          <a:p>
-            <a:pPr marL="285750" indent="-285750">
-              <a:buFont typeface="Arial" panose="020B0604020202020204" pitchFamily="34" charset="0"/>
-              <a:buChar char="•"/>
-            </a:pPr>
-            <a:endParaRPr lang="en-US" dirty="0"/>
-          </a:p>
-        </p:txBody>
-      </p:sp>
-      <p:sp>
-        <p:nvSpPr>
-          <p:cNvPr id="30" name="TextBox 29">
-            <a:extLst>
-              <a:ext uri="{FF2B5EF4-FFF2-40B4-BE49-F238E27FC236}">
-                <a16:creationId xmlns:a16="http://schemas.microsoft.com/office/drawing/2014/main" id="{F96A07F9-E533-4B52-BE37-CDEE6E63F375}"/>
-              </a:ext>
-            </a:extLst>
-          </p:cNvPr>
-          <p:cNvSpPr txBox="1"/>
-          <p:nvPr/>
-        </p:nvSpPr>
-        <p:spPr>
-          <a:xfrm>
-            <a:off x="9171445" y="3581833"/>
-            <a:ext cx="2259852" cy="646331"/>
-          </a:xfrm>
-          <a:prstGeom prst="rect">
-            <a:avLst/>
-          </a:prstGeom>
-          <a:noFill/>
-        </p:spPr>
-        <p:txBody>
-          <a:bodyPr wrap="square" rtlCol="0">
-            <a:spAutoFit/>
-          </a:bodyPr>
-          <a:lstStyle/>
-          <a:p>
-            <a:r>
-              <a:rPr lang="en-US" dirty="0" err="1"/>
-              <a:t>Maior</a:t>
-            </a:r>
-            <a:r>
-              <a:rPr lang="en-US" dirty="0"/>
-              <a:t> </a:t>
-            </a:r>
-            <a:r>
-              <a:rPr lang="en-US" dirty="0" err="1"/>
-              <a:t>gerenciamento</a:t>
-            </a:r>
-            <a:endParaRPr lang="en-US" dirty="0"/>
-          </a:p>
-          <a:p>
-            <a:pPr marL="285750" indent="-285750">
-              <a:buFont typeface="Arial" panose="020B0604020202020204" pitchFamily="34" charset="0"/>
-              <a:buChar char="•"/>
-            </a:pPr>
-            <a:endParaRPr lang="en-US" dirty="0"/>
-          </a:p>
-        </p:txBody>
-      </p:sp>
-      <p:sp>
-        <p:nvSpPr>
-          <p:cNvPr id="31" name="TextBox 30">
-            <a:extLst>
-              <a:ext uri="{FF2B5EF4-FFF2-40B4-BE49-F238E27FC236}">
-                <a16:creationId xmlns:a16="http://schemas.microsoft.com/office/drawing/2014/main" id="{5A159D86-6DEB-419A-B6E4-E42EEC5B876E}"/>
-              </a:ext>
-            </a:extLst>
-          </p:cNvPr>
-          <p:cNvSpPr txBox="1"/>
-          <p:nvPr/>
-        </p:nvSpPr>
-        <p:spPr>
-          <a:xfrm>
-            <a:off x="8139988" y="5414556"/>
-            <a:ext cx="1675354" cy="646331"/>
-          </a:xfrm>
-          <a:prstGeom prst="rect">
-            <a:avLst/>
-          </a:prstGeom>
-          <a:noFill/>
-        </p:spPr>
-        <p:txBody>
-          <a:bodyPr wrap="square" rtlCol="0">
-            <a:spAutoFit/>
-          </a:bodyPr>
-          <a:lstStyle/>
-          <a:p>
-            <a:r>
-              <a:rPr lang="en-US" dirty="0" err="1"/>
-              <a:t>Complexidade</a:t>
-            </a:r>
-            <a:endParaRPr lang="en-US" dirty="0"/>
-          </a:p>
-          <a:p>
-            <a:pPr marL="285750" indent="-285750">
-              <a:buFont typeface="Arial" panose="020B0604020202020204" pitchFamily="34" charset="0"/>
-              <a:buChar char="•"/>
-            </a:pPr>
-            <a:endParaRPr lang="en-US" dirty="0"/>
-          </a:p>
-        </p:txBody>
-      </p:sp>
-    </p:spTree>
-    <p:extLst>
-      <p:ext uri="{BB962C8B-B14F-4D97-AF65-F5344CB8AC3E}">
-        <p14:creationId xmlns:p14="http://schemas.microsoft.com/office/powerpoint/2010/main" val="904197471"/>
-      </p:ext>
-    </p:extLst>
-  </p:cSld>
-  <p:clrMapOvr>
-    <a:masterClrMapping/>
-  </p:clrMapOvr>
-</p:sld>
-</file>
-
-<file path=ppt/slides/slide8.xml><?xml version="1.0" encoding="utf-8"?>
-<p:sld xmlns:a="http://schemas.openxmlformats.org/drawingml/2006/main" xmlns:r="http://schemas.openxmlformats.org/officeDocument/2006/relationships" xmlns:p="http://schemas.openxmlformats.org/presentationml/2006/main">
-  <p:cSld>
-    <p:spTree>
-      <p:nvGrpSpPr>
-        <p:cNvPr id="1" name=""/>
-        <p:cNvGrpSpPr/>
-        <p:nvPr/>
-      </p:nvGrpSpPr>
-      <p:grpSpPr>
-        <a:xfrm>
-          <a:off x="0" y="0"/>
-          <a:ext cx="0" cy="0"/>
-          <a:chOff x="0" y="0"/>
-          <a:chExt cx="0" cy="0"/>
-        </a:xfrm>
-      </p:grpSpPr>
-      <p:sp>
-        <p:nvSpPr>
-          <p:cNvPr id="3" name="Título 2"/>
-          <p:cNvSpPr>
-            <a:spLocks noGrp="1"/>
-          </p:cNvSpPr>
-          <p:nvPr>
-            <p:ph type="title"/>
-          </p:nvPr>
-        </p:nvSpPr>
-        <p:spPr>
-          <a:xfrm>
-            <a:off x="1024128" y="585216"/>
-            <a:ext cx="9720072" cy="1499616"/>
-          </a:xfrm>
-        </p:spPr>
-        <p:txBody>
-          <a:bodyPr>
-            <a:normAutofit/>
-          </a:bodyPr>
-          <a:lstStyle/>
-          <a:p>
-            <a:r>
-              <a:rPr lang="pt-BR" sz="10000" spc="-300" dirty="0">
-                <a:solidFill>
-                  <a:schemeClr val="tx1"/>
-                </a:solidFill>
-              </a:rPr>
-              <a:t>Demo</a:t>
-            </a:r>
-          </a:p>
-        </p:txBody>
-      </p:sp>
-      <p:sp>
-        <p:nvSpPr>
-          <p:cNvPr id="4" name="CaixaDeTexto 3">
-            <a:extLst>
-              <a:ext uri="{FF2B5EF4-FFF2-40B4-BE49-F238E27FC236}">
-                <a16:creationId xmlns:a16="http://schemas.microsoft.com/office/drawing/2014/main" id="{057F1F55-D955-43F8-933C-19B7AF554E3E}"/>
-              </a:ext>
-            </a:extLst>
-          </p:cNvPr>
-          <p:cNvSpPr txBox="1"/>
-          <p:nvPr/>
-        </p:nvSpPr>
-        <p:spPr>
-          <a:xfrm>
-            <a:off x="9596486" y="6380946"/>
-            <a:ext cx="2488676" cy="477054"/>
-          </a:xfrm>
-          <a:prstGeom prst="rect">
-            <a:avLst/>
-          </a:prstGeom>
-          <a:noFill/>
-        </p:spPr>
-        <p:txBody>
-          <a:bodyPr wrap="square" rtlCol="0">
-            <a:spAutoFit/>
-          </a:bodyPr>
-          <a:lstStyle/>
-          <a:p>
-            <a:r>
-              <a:rPr lang="pt-BR" sz="2500" b="1" dirty="0">
-                <a:solidFill>
-                  <a:srgbClr val="67217A"/>
-                </a:solidFill>
-                <a:latin typeface="Verdana" panose="020B0604030504040204" pitchFamily="34" charset="0"/>
-                <a:ea typeface="Verdana" panose="020B0604030504040204" pitchFamily="34" charset="0"/>
-                <a:cs typeface="Verdana" panose="020B0604030504040204" pitchFamily="34" charset="0"/>
-              </a:rPr>
-              <a:t>#VSSUMMIT</a:t>
-            </a:r>
-          </a:p>
-        </p:txBody>
-      </p:sp>
-      <p:sp>
-        <p:nvSpPr>
-          <p:cNvPr id="5" name="Retângulo 4">
-            <a:extLst>
-              <a:ext uri="{FF2B5EF4-FFF2-40B4-BE49-F238E27FC236}">
-                <a16:creationId xmlns:a16="http://schemas.microsoft.com/office/drawing/2014/main" id="{55FCD02A-395C-4BC1-B17F-F2E2A0921C16}"/>
-              </a:ext>
-            </a:extLst>
-          </p:cNvPr>
-          <p:cNvSpPr/>
-          <p:nvPr/>
-        </p:nvSpPr>
-        <p:spPr>
-          <a:xfrm>
-            <a:off x="628203" y="2980378"/>
-            <a:ext cx="3133999" cy="1077218"/>
-          </a:xfrm>
-          <a:prstGeom prst="rect">
-            <a:avLst/>
-          </a:prstGeom>
-        </p:spPr>
-        <p:txBody>
-          <a:bodyPr wrap="none">
-            <a:spAutoFit/>
-          </a:bodyPr>
-          <a:lstStyle/>
-          <a:p>
-            <a:pPr marL="457200" indent="-457200">
-              <a:buFont typeface="Wingdings" panose="05000000000000000000" pitchFamily="2" charset="2"/>
-              <a:buChar char="§"/>
-            </a:pPr>
-            <a:r>
-              <a:rPr lang="pt-BR" sz="3200" dirty="0">
-                <a:solidFill>
-                  <a:srgbClr val="67217A"/>
-                </a:solidFill>
-                <a:latin typeface="Segoe UI Light" panose="020B0502040204020203" pitchFamily="34" charset="0"/>
-                <a:cs typeface="Segoe UI Light" panose="020B0502040204020203" pitchFamily="34" charset="0"/>
-              </a:rPr>
-              <a:t>ASP.NET CORE</a:t>
-            </a:r>
-          </a:p>
-          <a:p>
-            <a:pPr marL="457200" indent="-457200">
-              <a:buFont typeface="Wingdings" panose="05000000000000000000" pitchFamily="2" charset="2"/>
-              <a:buChar char="§"/>
-            </a:pPr>
-            <a:endParaRPr lang="pt-BR" sz="3200" dirty="0">
-              <a:solidFill>
-                <a:srgbClr val="67217A"/>
-              </a:solidFill>
-              <a:latin typeface="Segoe UI Light" panose="020B0502040204020203" pitchFamily="34" charset="0"/>
-              <a:cs typeface="Segoe UI Light" panose="020B0502040204020203" pitchFamily="34" charset="0"/>
-            </a:endParaRPr>
-          </a:p>
-        </p:txBody>
-      </p:sp>
-    </p:spTree>
-    <p:extLst>
-      <p:ext uri="{BB962C8B-B14F-4D97-AF65-F5344CB8AC3E}">
-        <p14:creationId xmlns:p14="http://schemas.microsoft.com/office/powerpoint/2010/main" val="2330706284"/>
-      </p:ext>
-    </p:extLst>
-  </p:cSld>
-  <p:clrMapOvr>
-    <a:masterClrMapping/>
-  </p:clrMapOvr>
-</p:sld>
-</file>
-
 <file path=ppt/slides/slide9.xml><?xml version="1.0" encoding="utf-8"?>
 <p:sld xmlns:a="http://schemas.openxmlformats.org/drawingml/2006/main" xmlns:r="http://schemas.openxmlformats.org/officeDocument/2006/relationships" xmlns:p="http://schemas.openxmlformats.org/presentationml/2006/main">
   <p:cSld>
@@ -8806,410 +10582,68 @@
       </p:grpSpPr>
       <p:sp>
         <p:nvSpPr>
-          <p:cNvPr id="2" name="Título 1"/>
+          <p:cNvPr id="2" name="Title 1">
+            <a:extLst>
+              <a:ext uri="{FF2B5EF4-FFF2-40B4-BE49-F238E27FC236}">
+                <a16:creationId xmlns:a16="http://schemas.microsoft.com/office/drawing/2014/main" id="{0EE6A544-78FA-4BE4-A731-73C111655EBF}"/>
+              </a:ext>
+            </a:extLst>
+          </p:cNvPr>
           <p:cNvSpPr>
             <a:spLocks noGrp="1"/>
           </p:cNvSpPr>
           <p:nvPr>
-            <p:ph type="ctrTitle"/>
+            <p:ph type="title"/>
           </p:nvPr>
         </p:nvSpPr>
-        <p:spPr>
-          <a:xfrm>
-            <a:off x="106838" y="5051716"/>
-            <a:ext cx="7772400" cy="1463040"/>
-          </a:xfrm>
-        </p:spPr>
-        <p:txBody>
-          <a:bodyPr>
-            <a:normAutofit fontScale="90000"/>
-          </a:bodyPr>
+        <p:spPr/>
+        <p:txBody>
+          <a:bodyPr/>
           <a:lstStyle/>
           <a:p>
-            <a:pPr algn="l"/>
-            <a:r>
-              <a:rPr lang="pt-BR" sz="6000" spc="-150" dirty="0"/>
-              <a:t>Albert TAnure</a:t>
-            </a:r>
-            <a:br>
-              <a:rPr lang="pt-BR" sz="6000" spc="-150" dirty="0"/>
-            </a:br>
-            <a:r>
-              <a:rPr lang="pt-BR" sz="4400" spc="-150" dirty="0"/>
-              <a:t>Microsoft MVP</a:t>
-            </a:r>
-            <a:br>
-              <a:rPr lang="pt-BR" sz="4400" spc="-150" dirty="0"/>
-            </a:br>
-            <a:r>
-              <a:rPr lang="pt-BR" sz="4400" spc="-150" dirty="0"/>
-              <a:t>tanure@live.com</a:t>
-            </a:r>
-            <a:endParaRPr lang="pt-BR" sz="3000" spc="-150" dirty="0">
-              <a:latin typeface="+mn-lt"/>
-            </a:endParaRPr>
-          </a:p>
-        </p:txBody>
-      </p:sp>
-      <p:cxnSp>
-        <p:nvCxnSpPr>
-          <p:cNvPr id="7" name="Straight Connector 7"/>
-          <p:cNvCxnSpPr/>
-          <p:nvPr/>
-        </p:nvCxnSpPr>
-        <p:spPr>
-          <a:xfrm flipV="1">
-            <a:off x="6618055" y="5326036"/>
-            <a:ext cx="0" cy="914400"/>
-          </a:xfrm>
-          <a:prstGeom prst="line">
-            <a:avLst/>
-          </a:prstGeom>
-          <a:ln w="19050">
-            <a:solidFill>
-              <a:srgbClr val="67217A"/>
-            </a:solidFill>
-          </a:ln>
-        </p:spPr>
-        <p:style>
-          <a:lnRef idx="1">
-            <a:schemeClr val="accent1"/>
-          </a:lnRef>
-          <a:fillRef idx="0">
-            <a:schemeClr val="accent1"/>
-          </a:fillRef>
-          <a:effectRef idx="0">
-            <a:schemeClr val="accent1"/>
-          </a:effectRef>
-          <a:fontRef idx="minor">
-            <a:schemeClr val="tx1"/>
-          </a:fontRef>
-        </p:style>
-      </p:cxnSp>
+            <a:r>
+              <a:rPr lang="en-US" dirty="0"/>
+              <a:t>Feature toggle</a:t>
+            </a:r>
+          </a:p>
+        </p:txBody>
+      </p:sp>
       <p:pic>
         <p:nvPicPr>
-          <p:cNvPr id="3" name="Imagem 2"/>
+          <p:cNvPr id="3" name="Picture 2">
+            <a:extLst>
+              <a:ext uri="{FF2B5EF4-FFF2-40B4-BE49-F238E27FC236}">
+                <a16:creationId xmlns:a16="http://schemas.microsoft.com/office/drawing/2014/main" id="{2534A7CC-E21F-48AB-86F2-2F809475DF61}"/>
+              </a:ext>
+            </a:extLst>
+          </p:cNvPr>
           <p:cNvPicPr>
             <a:picLocks noChangeAspect="1"/>
           </p:cNvPicPr>
           <p:nvPr/>
         </p:nvPicPr>
-        <p:blipFill rotWithShape="1">
+        <p:blipFill>
           <a:blip r:embed="rId2"/>
-          <a:srcRect r="18374"/>
-          <a:stretch/>
+          <a:stretch>
+            <a:fillRect/>
+          </a:stretch>
         </p:blipFill>
         <p:spPr>
           <a:xfrm>
-            <a:off x="6929448" y="5421302"/>
-            <a:ext cx="4901069" cy="723867"/>
+            <a:off x="673262" y="1895435"/>
+            <a:ext cx="5210902" cy="2915057"/>
           </a:xfrm>
           <a:prstGeom prst="rect">
             <a:avLst/>
           </a:prstGeom>
         </p:spPr>
       </p:pic>
-      <p:sp>
-        <p:nvSpPr>
-          <p:cNvPr id="8" name="CaixaDeTexto 7"/>
-          <p:cNvSpPr txBox="1"/>
-          <p:nvPr/>
-        </p:nvSpPr>
-        <p:spPr>
-          <a:xfrm>
-            <a:off x="9775595" y="6380946"/>
-            <a:ext cx="2488676" cy="477054"/>
-          </a:xfrm>
-          <a:prstGeom prst="rect">
-            <a:avLst/>
-          </a:prstGeom>
-          <a:noFill/>
-        </p:spPr>
-        <p:txBody>
-          <a:bodyPr wrap="square" rtlCol="0">
-            <a:spAutoFit/>
-          </a:bodyPr>
-          <a:lstStyle/>
-          <a:p>
-            <a:r>
-              <a:rPr lang="pt-BR" sz="2500" b="1" dirty="0">
-                <a:solidFill>
-                  <a:srgbClr val="67217A"/>
-                </a:solidFill>
-                <a:latin typeface="Verdana" panose="020B0604030504040204" pitchFamily="34" charset="0"/>
-                <a:ea typeface="Verdana" panose="020B0604030504040204" pitchFamily="34" charset="0"/>
-                <a:cs typeface="Verdana" panose="020B0604030504040204" pitchFamily="34" charset="0"/>
-              </a:rPr>
-              <a:t>#VSSUMMIT</a:t>
-            </a:r>
-          </a:p>
-        </p:txBody>
-      </p:sp>
-      <p:sp>
-        <p:nvSpPr>
-          <p:cNvPr id="9" name="Espaço Reservado para Conteúdo 3">
+      <p:pic>
+        <p:nvPicPr>
+          <p:cNvPr id="4" name="Picture 3">
             <a:extLst>
               <a:ext uri="{FF2B5EF4-FFF2-40B4-BE49-F238E27FC236}">
-                <a16:creationId xmlns:a16="http://schemas.microsoft.com/office/drawing/2014/main" id="{F40C3102-DE54-4871-AA50-E1EBDB38DBD4}"/>
-              </a:ext>
-            </a:extLst>
-          </p:cNvPr>
-          <p:cNvSpPr txBox="1">
-            <a:spLocks/>
-          </p:cNvSpPr>
-          <p:nvPr/>
-        </p:nvSpPr>
-        <p:spPr>
-          <a:xfrm>
-            <a:off x="3320667" y="1800262"/>
-            <a:ext cx="7209461" cy="621897"/>
-          </a:xfrm>
-          <a:prstGeom prst="rect">
-            <a:avLst/>
-          </a:prstGeom>
-        </p:spPr>
-        <p:txBody>
-          <a:bodyPr vert="horz" lIns="45720" tIns="45720" rIns="45720" bIns="45720" rtlCol="0">
-            <a:noAutofit/>
-          </a:bodyPr>
-          <a:lstStyle>
-            <a:lvl1pPr marL="91440" indent="-91440" algn="l" defTabSz="914400" rtl="0" eaLnBrk="1" latinLnBrk="0" hangingPunct="1">
-              <a:lnSpc>
-                <a:spcPct val="90000"/>
-              </a:lnSpc>
-              <a:spcBef>
-                <a:spcPts val="1200"/>
-              </a:spcBef>
-              <a:spcAft>
-                <a:spcPts val="200"/>
-              </a:spcAft>
-              <a:buClr>
-                <a:schemeClr val="accent2"/>
-              </a:buClr>
-              <a:buSzPct val="100000"/>
-              <a:buFont typeface="Tw Cen MT" panose="020B0602020104020603" pitchFamily="34" charset="0"/>
-              <a:buChar char=" "/>
-              <a:defRPr sz="2200" kern="1200">
-                <a:solidFill>
-                  <a:schemeClr val="tx1"/>
-                </a:solidFill>
-                <a:latin typeface="+mn-lt"/>
-                <a:ea typeface="+mn-ea"/>
-                <a:cs typeface="+mn-cs"/>
-              </a:defRPr>
-            </a:lvl1pPr>
-            <a:lvl2pPr marL="265176" indent="-137160" algn="l" defTabSz="914400" rtl="0" eaLnBrk="1" latinLnBrk="0" hangingPunct="1">
-              <a:lnSpc>
-                <a:spcPct val="90000"/>
-              </a:lnSpc>
-              <a:spcBef>
-                <a:spcPts val="200"/>
-              </a:spcBef>
-              <a:spcAft>
-                <a:spcPts val="400"/>
-              </a:spcAft>
-              <a:buClr>
-                <a:schemeClr val="accent2"/>
-              </a:buClr>
-              <a:buFont typeface="Wingdings 3" pitchFamily="18" charset="2"/>
-              <a:buChar char=""/>
-              <a:defRPr sz="1800" kern="1200">
-                <a:solidFill>
-                  <a:schemeClr val="tx1"/>
-                </a:solidFill>
-                <a:latin typeface="+mn-lt"/>
-                <a:ea typeface="+mn-ea"/>
-                <a:cs typeface="+mn-cs"/>
-              </a:defRPr>
-            </a:lvl2pPr>
-            <a:lvl3pPr marL="448056" indent="-137160" algn="l" defTabSz="914400" rtl="0" eaLnBrk="1" latinLnBrk="0" hangingPunct="1">
-              <a:lnSpc>
-                <a:spcPct val="90000"/>
-              </a:lnSpc>
-              <a:spcBef>
-                <a:spcPts val="200"/>
-              </a:spcBef>
-              <a:spcAft>
-                <a:spcPts val="400"/>
-              </a:spcAft>
-              <a:buClr>
-                <a:schemeClr val="accent2"/>
-              </a:buClr>
-              <a:buFont typeface="Wingdings 3" pitchFamily="18" charset="2"/>
-              <a:buChar char=""/>
-              <a:defRPr sz="1400" kern="1200">
-                <a:solidFill>
-                  <a:schemeClr val="tx1"/>
-                </a:solidFill>
-                <a:latin typeface="+mn-lt"/>
-                <a:ea typeface="+mn-ea"/>
-                <a:cs typeface="+mn-cs"/>
-              </a:defRPr>
-            </a:lvl3pPr>
-            <a:lvl4pPr marL="594360" indent="-137160" algn="l" defTabSz="914400" rtl="0" eaLnBrk="1" latinLnBrk="0" hangingPunct="1">
-              <a:lnSpc>
-                <a:spcPct val="90000"/>
-              </a:lnSpc>
-              <a:spcBef>
-                <a:spcPts val="200"/>
-              </a:spcBef>
-              <a:spcAft>
-                <a:spcPts val="400"/>
-              </a:spcAft>
-              <a:buClr>
-                <a:schemeClr val="accent2"/>
-              </a:buClr>
-              <a:buFont typeface="Wingdings 3" pitchFamily="18" charset="2"/>
-              <a:buChar char=""/>
-              <a:defRPr sz="1400" kern="1200">
-                <a:solidFill>
-                  <a:schemeClr val="tx1"/>
-                </a:solidFill>
-                <a:latin typeface="+mn-lt"/>
-                <a:ea typeface="+mn-ea"/>
-                <a:cs typeface="+mn-cs"/>
-              </a:defRPr>
-            </a:lvl4pPr>
-            <a:lvl5pPr marL="777240" indent="-137160" algn="l" defTabSz="914400" rtl="0" eaLnBrk="1" latinLnBrk="0" hangingPunct="1">
-              <a:lnSpc>
-                <a:spcPct val="90000"/>
-              </a:lnSpc>
-              <a:spcBef>
-                <a:spcPts val="200"/>
-              </a:spcBef>
-              <a:spcAft>
-                <a:spcPts val="400"/>
-              </a:spcAft>
-              <a:buClr>
-                <a:schemeClr val="accent2"/>
-              </a:buClr>
-              <a:buFont typeface="Wingdings 3" pitchFamily="18" charset="2"/>
-              <a:buChar char=""/>
-              <a:defRPr sz="1400" kern="1200">
-                <a:solidFill>
-                  <a:schemeClr val="tx1"/>
-                </a:solidFill>
-                <a:latin typeface="+mn-lt"/>
-                <a:ea typeface="+mn-ea"/>
-                <a:cs typeface="+mn-cs"/>
-              </a:defRPr>
-            </a:lvl5pPr>
-            <a:lvl6pPr marL="914400" indent="-137160" algn="l" defTabSz="914400" rtl="0" eaLnBrk="1" latinLnBrk="0" hangingPunct="1">
-              <a:lnSpc>
-                <a:spcPct val="90000"/>
-              </a:lnSpc>
-              <a:spcBef>
-                <a:spcPts val="200"/>
-              </a:spcBef>
-              <a:spcAft>
-                <a:spcPts val="400"/>
-              </a:spcAft>
-              <a:buClr>
-                <a:schemeClr val="accent2"/>
-              </a:buClr>
-              <a:buFont typeface="Wingdings 3" pitchFamily="18" charset="2"/>
-              <a:buChar char=""/>
-              <a:defRPr sz="1400" kern="1200">
-                <a:solidFill>
-                  <a:schemeClr val="tx1"/>
-                </a:solidFill>
-                <a:latin typeface="+mn-lt"/>
-                <a:ea typeface="+mn-ea"/>
-                <a:cs typeface="+mn-cs"/>
-              </a:defRPr>
-            </a:lvl6pPr>
-            <a:lvl7pPr marL="1060704" indent="-137160" algn="l" defTabSz="914400" rtl="0" eaLnBrk="1" latinLnBrk="0" hangingPunct="1">
-              <a:lnSpc>
-                <a:spcPct val="90000"/>
-              </a:lnSpc>
-              <a:spcBef>
-                <a:spcPts val="200"/>
-              </a:spcBef>
-              <a:spcAft>
-                <a:spcPts val="400"/>
-              </a:spcAft>
-              <a:buClr>
-                <a:schemeClr val="accent2"/>
-              </a:buClr>
-              <a:buFont typeface="Wingdings 3" pitchFamily="18" charset="2"/>
-              <a:buChar char=""/>
-              <a:defRPr sz="1400" kern="1200">
-                <a:solidFill>
-                  <a:schemeClr val="tx1"/>
-                </a:solidFill>
-                <a:latin typeface="+mn-lt"/>
-                <a:ea typeface="+mn-ea"/>
-                <a:cs typeface="+mn-cs"/>
-              </a:defRPr>
-            </a:lvl7pPr>
-            <a:lvl8pPr marL="1216152" indent="-137160" algn="l" defTabSz="914400" rtl="0" eaLnBrk="1" latinLnBrk="0" hangingPunct="1">
-              <a:lnSpc>
-                <a:spcPct val="90000"/>
-              </a:lnSpc>
-              <a:spcBef>
-                <a:spcPts val="200"/>
-              </a:spcBef>
-              <a:spcAft>
-                <a:spcPts val="400"/>
-              </a:spcAft>
-              <a:buClr>
-                <a:schemeClr val="accent2"/>
-              </a:buClr>
-              <a:buFont typeface="Wingdings 3" pitchFamily="18" charset="2"/>
-              <a:buChar char=""/>
-              <a:defRPr sz="1400" kern="1200">
-                <a:solidFill>
-                  <a:schemeClr val="tx1"/>
-                </a:solidFill>
-                <a:latin typeface="+mn-lt"/>
-                <a:ea typeface="+mn-ea"/>
-                <a:cs typeface="+mn-cs"/>
-              </a:defRPr>
-            </a:lvl8pPr>
-            <a:lvl9pPr marL="1362456" indent="-137160" algn="l" defTabSz="914400" rtl="0" eaLnBrk="1" latinLnBrk="0" hangingPunct="1">
-              <a:lnSpc>
-                <a:spcPct val="90000"/>
-              </a:lnSpc>
-              <a:spcBef>
-                <a:spcPts val="200"/>
-              </a:spcBef>
-              <a:spcAft>
-                <a:spcPts val="400"/>
-              </a:spcAft>
-              <a:buClr>
-                <a:schemeClr val="accent2"/>
-              </a:buClr>
-              <a:buFont typeface="Wingdings 3" pitchFamily="18" charset="2"/>
-              <a:buChar char=""/>
-              <a:defRPr sz="1400" kern="1200">
-                <a:solidFill>
-                  <a:schemeClr val="tx1"/>
-                </a:solidFill>
-                <a:latin typeface="+mn-lt"/>
-                <a:ea typeface="+mn-ea"/>
-                <a:cs typeface="+mn-cs"/>
-              </a:defRPr>
-            </a:lvl9pPr>
-          </a:lstStyle>
-          <a:p>
-            <a:r>
-              <a:rPr lang="pt-BR" sz="6600" spc="-300" dirty="0">
-                <a:solidFill>
-                  <a:schemeClr val="bg1"/>
-                </a:solidFill>
-                <a:latin typeface="+mj-lt"/>
-              </a:rPr>
-              <a:t>MUITO OBRIGADO!</a:t>
-            </a:r>
-          </a:p>
-        </p:txBody>
-      </p:sp>
-      <p:pic>
-        <p:nvPicPr>
-          <p:cNvPr id="11" name="Picture 10" descr="A picture containing object&#10;&#10;Description automatically generated">
-            <a:extLst>
-              <a:ext uri="{FF2B5EF4-FFF2-40B4-BE49-F238E27FC236}">
-                <a16:creationId xmlns:a16="http://schemas.microsoft.com/office/drawing/2014/main" id="{99642CF2-B601-4950-90B3-ABB26CEBE840}"/>
+                <a16:creationId xmlns:a16="http://schemas.microsoft.com/office/drawing/2014/main" id="{6F286CB5-7733-4BB5-B4A7-44FC71A6774A}"/>
               </a:ext>
             </a:extLst>
           </p:cNvPr>
@@ -9226,87 +10660,18 @@
         </p:blipFill>
         <p:spPr>
           <a:xfrm>
-            <a:off x="9126120" y="53801"/>
-            <a:ext cx="2835026" cy="3681754"/>
+            <a:off x="6812564" y="433144"/>
+            <a:ext cx="4677428" cy="5839640"/>
           </a:xfrm>
           <a:prstGeom prst="rect">
             <a:avLst/>
           </a:prstGeom>
         </p:spPr>
       </p:pic>
-      <p:sp>
-        <p:nvSpPr>
-          <p:cNvPr id="12" name="Título 1">
-            <a:extLst>
-              <a:ext uri="{FF2B5EF4-FFF2-40B4-BE49-F238E27FC236}">
-                <a16:creationId xmlns:a16="http://schemas.microsoft.com/office/drawing/2014/main" id="{608EFFAB-AB7D-4857-89FA-3AF3A94406F9}"/>
-              </a:ext>
-            </a:extLst>
-          </p:cNvPr>
-          <p:cNvSpPr txBox="1">
-            <a:spLocks/>
-          </p:cNvSpPr>
-          <p:nvPr/>
-        </p:nvSpPr>
-        <p:spPr>
-          <a:xfrm>
-            <a:off x="9233613" y="3889586"/>
-            <a:ext cx="2620039" cy="431110"/>
-          </a:xfrm>
-          <a:prstGeom prst="rect">
-            <a:avLst/>
-          </a:prstGeom>
-        </p:spPr>
-        <p:txBody>
-          <a:bodyPr vert="horz" lIns="91440" tIns="45720" rIns="91440" bIns="45720" rtlCol="0" anchor="ctr">
-            <a:normAutofit/>
-          </a:bodyPr>
-          <a:lstStyle>
-            <a:lvl1pPr algn="r" defTabSz="914400" rtl="0" eaLnBrk="1" latinLnBrk="0" hangingPunct="1">
-              <a:lnSpc>
-                <a:spcPct val="80000"/>
-              </a:lnSpc>
-              <a:spcBef>
-                <a:spcPct val="0"/>
-              </a:spcBef>
-              <a:buNone/>
-              <a:defRPr sz="5000" kern="1200" cap="all" spc="200" baseline="0">
-                <a:solidFill>
-                  <a:schemeClr val="tx1">
-                    <a:lumMod val="90000"/>
-                    <a:lumOff val="10000"/>
-                  </a:schemeClr>
-                </a:solidFill>
-                <a:latin typeface="+mj-lt"/>
-                <a:ea typeface="+mj-ea"/>
-                <a:cs typeface="+mj-cs"/>
-              </a:defRPr>
-            </a:lvl1pPr>
-          </a:lstStyle>
-          <a:p>
-            <a:pPr algn="l"/>
-            <a:r>
-              <a:rPr lang="pt-BR" sz="2000" spc="-150" dirty="0">
-                <a:solidFill>
-                  <a:schemeClr val="bg1"/>
-                </a:solidFill>
-                <a:latin typeface="+mn-lt"/>
-              </a:rPr>
-              <a:t>https://bit.ly/31LCvQp</a:t>
-            </a:r>
-            <a:endParaRPr lang="pt-BR" sz="1600" spc="-150" dirty="0">
-              <a:solidFill>
-                <a:schemeClr val="bg1"/>
-              </a:solidFill>
-              <a:latin typeface="+mn-lt"/>
-            </a:endParaRPr>
-          </a:p>
-        </p:txBody>
-      </p:sp>
     </p:spTree>
     <p:extLst>
       <p:ext uri="{BB962C8B-B14F-4D97-AF65-F5344CB8AC3E}">
-        <p14:creationId xmlns:p14="http://schemas.microsoft.com/office/powerpoint/2010/main" val="1100175642"/>
+        <p14:creationId xmlns:p14="http://schemas.microsoft.com/office/powerpoint/2010/main" val="3161805787"/>
       </p:ext>
     </p:extLst>
   </p:cSld>

</xml_diff>